<commit_message>
final commit before presentation
</commit_message>
<xml_diff>
--- a/ArthurIMS-presentation.pptx
+++ b/ArthurIMS-presentation.pptx
@@ -10,13 +10,14 @@
     <p:sldId id="257" r:id="rId4"/>
     <p:sldId id="258" r:id="rId5"/>
     <p:sldId id="259" r:id="rId6"/>
-    <p:sldId id="260" r:id="rId7"/>
-    <p:sldId id="261" r:id="rId8"/>
-    <p:sldId id="265" r:id="rId9"/>
-    <p:sldId id="262" r:id="rId10"/>
-    <p:sldId id="263" r:id="rId11"/>
-    <p:sldId id="264" r:id="rId12"/>
-    <p:sldId id="266" r:id="rId13"/>
+    <p:sldId id="268" r:id="rId7"/>
+    <p:sldId id="260" r:id="rId8"/>
+    <p:sldId id="261" r:id="rId9"/>
+    <p:sldId id="265" r:id="rId10"/>
+    <p:sldId id="262" r:id="rId11"/>
+    <p:sldId id="263" r:id="rId12"/>
+    <p:sldId id="264" r:id="rId13"/>
+    <p:sldId id="266" r:id="rId14"/>
   </p:sldIdLst>
   <p:sldSz cx="12192000" cy="6858000"/>
   <p:notesSz cx="6858000" cy="9144000"/>
@@ -123,12 +124,20 @@
 </p:presentation>
 </file>
 
+<file path=ppt/revisionInfo.xml><?xml version="1.0" encoding="utf-8"?>
+<p1510:revInfo xmlns:a="http://schemas.openxmlformats.org/drawingml/2006/main" xmlns:r="http://schemas.openxmlformats.org/officeDocument/2006/relationships" xmlns:p1510="http://schemas.microsoft.com/office/powerpoint/2015/10/main">
+  <p1510:revLst>
+    <p1510:client id="{972C1A0A-D0B9-4A51-81B4-F7220E8F5A00}" v="2" dt="2020-07-17T08:54:17.967"/>
+  </p1510:revLst>
+</p1510:revInfo>
+</file>
+
 <file path=ppt/changesInfos/changesInfo1.xml><?xml version="1.0" encoding="utf-8"?>
 <pc:chgInfo xmlns:a="http://schemas.openxmlformats.org/drawingml/2006/main" xmlns:r="http://schemas.openxmlformats.org/officeDocument/2006/relationships" xmlns:ac="http://schemas.microsoft.com/office/drawing/2013/main/command" xmlns:pc="http://schemas.microsoft.com/office/powerpoint/2013/main/command">
   <pc:docChgLst>
     <pc:chgData name="Eoin Rafferty" userId="a35ed0867f933026" providerId="LiveId" clId="{972C1A0A-D0B9-4A51-81B4-F7220E8F5A00}"/>
     <pc:docChg chg="custSel mod addSld modSld">
-      <pc:chgData name="Eoin Rafferty" userId="a35ed0867f933026" providerId="LiveId" clId="{972C1A0A-D0B9-4A51-81B4-F7220E8F5A00}" dt="2020-07-17T08:40:16.028" v="468" actId="1076"/>
+      <pc:chgData name="Eoin Rafferty" userId="a35ed0867f933026" providerId="LiveId" clId="{972C1A0A-D0B9-4A51-81B4-F7220E8F5A00}" dt="2020-07-17T09:05:44.071" v="888" actId="26606"/>
       <pc:docMkLst>
         <pc:docMk/>
       </pc:docMkLst>
@@ -147,8 +156,133 @@
           </ac:spMkLst>
         </pc:spChg>
       </pc:sldChg>
+      <pc:sldChg chg="modSp mod">
+        <pc:chgData name="Eoin Rafferty" userId="a35ed0867f933026" providerId="LiveId" clId="{972C1A0A-D0B9-4A51-81B4-F7220E8F5A00}" dt="2020-07-17T08:43:21.055" v="569" actId="20577"/>
+        <pc:sldMkLst>
+          <pc:docMk/>
+          <pc:sldMk cId="162083524" sldId="260"/>
+        </pc:sldMkLst>
+        <pc:spChg chg="mod">
+          <ac:chgData name="Eoin Rafferty" userId="a35ed0867f933026" providerId="LiveId" clId="{972C1A0A-D0B9-4A51-81B4-F7220E8F5A00}" dt="2020-07-17T08:42:56.483" v="494" actId="20577"/>
+          <ac:spMkLst>
+            <pc:docMk/>
+            <pc:sldMk cId="162083524" sldId="260"/>
+            <ac:spMk id="2" creationId="{26EE2BD2-49AA-4153-838B-EA25527699A6}"/>
+          </ac:spMkLst>
+        </pc:spChg>
+        <pc:spChg chg="mod">
+          <ac:chgData name="Eoin Rafferty" userId="a35ed0867f933026" providerId="LiveId" clId="{972C1A0A-D0B9-4A51-81B4-F7220E8F5A00}" dt="2020-07-17T08:43:21.055" v="569" actId="20577"/>
+          <ac:spMkLst>
+            <pc:docMk/>
+            <pc:sldMk cId="162083524" sldId="260"/>
+            <ac:spMk id="3" creationId="{D3553F12-196E-423C-B8DF-F1BC52D9A0DD}"/>
+          </ac:spMkLst>
+        </pc:spChg>
+      </pc:sldChg>
+      <pc:sldChg chg="addSp modSp mod setBg">
+        <pc:chgData name="Eoin Rafferty" userId="a35ed0867f933026" providerId="LiveId" clId="{972C1A0A-D0B9-4A51-81B4-F7220E8F5A00}" dt="2020-07-17T09:05:44.071" v="888" actId="26606"/>
+        <pc:sldMkLst>
+          <pc:docMk/>
+          <pc:sldMk cId="3854591744" sldId="263"/>
+        </pc:sldMkLst>
+        <pc:spChg chg="mod">
+          <ac:chgData name="Eoin Rafferty" userId="a35ed0867f933026" providerId="LiveId" clId="{972C1A0A-D0B9-4A51-81B4-F7220E8F5A00}" dt="2020-07-17T09:05:44.071" v="888" actId="26606"/>
+          <ac:spMkLst>
+            <pc:docMk/>
+            <pc:sldMk cId="3854591744" sldId="263"/>
+            <ac:spMk id="2" creationId="{D7D33629-6D4B-41CB-8170-23E0454EFDDC}"/>
+          </ac:spMkLst>
+        </pc:spChg>
+        <pc:spChg chg="mod">
+          <ac:chgData name="Eoin Rafferty" userId="a35ed0867f933026" providerId="LiveId" clId="{972C1A0A-D0B9-4A51-81B4-F7220E8F5A00}" dt="2020-07-17T09:05:44.071" v="888" actId="26606"/>
+          <ac:spMkLst>
+            <pc:docMk/>
+            <pc:sldMk cId="3854591744" sldId="263"/>
+            <ac:spMk id="3" creationId="{8C354780-54D4-4492-A5F6-9183520234CE}"/>
+          </ac:spMkLst>
+        </pc:spChg>
+        <pc:spChg chg="add">
+          <ac:chgData name="Eoin Rafferty" userId="a35ed0867f933026" providerId="LiveId" clId="{972C1A0A-D0B9-4A51-81B4-F7220E8F5A00}" dt="2020-07-17T09:05:44.071" v="888" actId="26606"/>
+          <ac:spMkLst>
+            <pc:docMk/>
+            <pc:sldMk cId="3854591744" sldId="263"/>
+            <ac:spMk id="8" creationId="{F5FE1B2C-7BC1-4AE2-9A50-2A4A70A9D6A1}"/>
+          </ac:spMkLst>
+        </pc:spChg>
+        <pc:spChg chg="add">
+          <ac:chgData name="Eoin Rafferty" userId="a35ed0867f933026" providerId="LiveId" clId="{972C1A0A-D0B9-4A51-81B4-F7220E8F5A00}" dt="2020-07-17T09:05:44.071" v="888" actId="26606"/>
+          <ac:spMkLst>
+            <pc:docMk/>
+            <pc:sldMk cId="3854591744" sldId="263"/>
+            <ac:spMk id="10" creationId="{97E8244A-2C81-4C0E-A929-3EC8EFF35564}"/>
+          </ac:spMkLst>
+        </pc:spChg>
+        <pc:cxnChg chg="add">
+          <ac:chgData name="Eoin Rafferty" userId="a35ed0867f933026" providerId="LiveId" clId="{972C1A0A-D0B9-4A51-81B4-F7220E8F5A00}" dt="2020-07-17T09:05:44.071" v="888" actId="26606"/>
+          <ac:cxnSpMkLst>
+            <pc:docMk/>
+            <pc:sldMk cId="3854591744" sldId="263"/>
+            <ac:cxnSpMk id="12" creationId="{02CC3441-26B3-4381-B3DF-8AE3C288BC0D}"/>
+          </ac:cxnSpMkLst>
+        </pc:cxnChg>
+      </pc:sldChg>
+      <pc:sldChg chg="addSp modSp mod setBg">
+        <pc:chgData name="Eoin Rafferty" userId="a35ed0867f933026" providerId="LiveId" clId="{972C1A0A-D0B9-4A51-81B4-F7220E8F5A00}" dt="2020-07-17T08:54:17.967" v="887"/>
+        <pc:sldMkLst>
+          <pc:docMk/>
+          <pc:sldMk cId="1135029356" sldId="264"/>
+        </pc:sldMkLst>
+        <pc:spChg chg="mod">
+          <ac:chgData name="Eoin Rafferty" userId="a35ed0867f933026" providerId="LiveId" clId="{972C1A0A-D0B9-4A51-81B4-F7220E8F5A00}" dt="2020-07-17T08:54:11.408" v="886" actId="26606"/>
+          <ac:spMkLst>
+            <pc:docMk/>
+            <pc:sldMk cId="1135029356" sldId="264"/>
+            <ac:spMk id="2" creationId="{7D5EA7FA-F78C-478D-AA9A-99B6A83BEEFE}"/>
+          </ac:spMkLst>
+        </pc:spChg>
+        <pc:spChg chg="mod">
+          <ac:chgData name="Eoin Rafferty" userId="a35ed0867f933026" providerId="LiveId" clId="{972C1A0A-D0B9-4A51-81B4-F7220E8F5A00}" dt="2020-07-17T08:54:11.408" v="886" actId="26606"/>
+          <ac:spMkLst>
+            <pc:docMk/>
+            <pc:sldMk cId="1135029356" sldId="264"/>
+            <ac:spMk id="3" creationId="{B23366F2-64EC-4ACA-B778-CD44916F3176}"/>
+          </ac:spMkLst>
+        </pc:spChg>
+        <pc:spChg chg="add">
+          <ac:chgData name="Eoin Rafferty" userId="a35ed0867f933026" providerId="LiveId" clId="{972C1A0A-D0B9-4A51-81B4-F7220E8F5A00}" dt="2020-07-17T08:54:11.408" v="886" actId="26606"/>
+          <ac:spMkLst>
+            <pc:docMk/>
+            <pc:sldMk cId="1135029356" sldId="264"/>
+            <ac:spMk id="71" creationId="{13BCCAE5-A35B-4B66-A4A7-E23C34A403A4}"/>
+          </ac:spMkLst>
+        </pc:spChg>
+        <pc:spChg chg="add">
+          <ac:chgData name="Eoin Rafferty" userId="a35ed0867f933026" providerId="LiveId" clId="{972C1A0A-D0B9-4A51-81B4-F7220E8F5A00}" dt="2020-07-17T08:54:11.408" v="886" actId="26606"/>
+          <ac:spMkLst>
+            <pc:docMk/>
+            <pc:sldMk cId="1135029356" sldId="264"/>
+            <ac:spMk id="75" creationId="{CB06839E-D8C3-4A74-BA2B-3B97E7B2CDB5}"/>
+          </ac:spMkLst>
+        </pc:spChg>
+        <pc:picChg chg="mod">
+          <ac:chgData name="Eoin Rafferty" userId="a35ed0867f933026" providerId="LiveId" clId="{972C1A0A-D0B9-4A51-81B4-F7220E8F5A00}" dt="2020-07-17T08:54:11.408" v="886" actId="26606"/>
+          <ac:picMkLst>
+            <pc:docMk/>
+            <pc:sldMk cId="1135029356" sldId="264"/>
+            <ac:picMk id="1026" creationId="{96334A54-1D29-4C5A-90D4-C5E4F896A998}"/>
+          </ac:picMkLst>
+        </pc:picChg>
+        <pc:cxnChg chg="add">
+          <ac:chgData name="Eoin Rafferty" userId="a35ed0867f933026" providerId="LiveId" clId="{972C1A0A-D0B9-4A51-81B4-F7220E8F5A00}" dt="2020-07-17T08:54:11.408" v="886" actId="26606"/>
+          <ac:cxnSpMkLst>
+            <pc:docMk/>
+            <pc:sldMk cId="1135029356" sldId="264"/>
+            <ac:cxnSpMk id="73" creationId="{6987BDFB-DE64-4B56-B44F-45FAE19FA94E}"/>
+          </ac:cxnSpMkLst>
+        </pc:cxnChg>
+      </pc:sldChg>
       <pc:sldChg chg="addSp modSp new mod setBg">
-        <pc:chgData name="Eoin Rafferty" userId="a35ed0867f933026" providerId="LiveId" clId="{972C1A0A-D0B9-4A51-81B4-F7220E8F5A00}" dt="2020-07-17T08:40:16.028" v="468" actId="1076"/>
+        <pc:chgData name="Eoin Rafferty" userId="a35ed0867f933026" providerId="LiveId" clId="{972C1A0A-D0B9-4A51-81B4-F7220E8F5A00}" dt="2020-07-17T08:51:50.102" v="885"/>
         <pc:sldMkLst>
           <pc:docMk/>
           <pc:sldMk cId="2390453509" sldId="267"/>
@@ -193,6 +327,69 @@
             <ac:spMk id="12" creationId="{359CEC61-F44B-43B3-B40F-AE38C5AF1D5F}"/>
           </ac:spMkLst>
         </pc:spChg>
+      </pc:sldChg>
+      <pc:sldChg chg="addSp delSp modSp new mod setBg">
+        <pc:chgData name="Eoin Rafferty" userId="a35ed0867f933026" providerId="LiveId" clId="{972C1A0A-D0B9-4A51-81B4-F7220E8F5A00}" dt="2020-07-17T08:49:36.275" v="884" actId="1076"/>
+        <pc:sldMkLst>
+          <pc:docMk/>
+          <pc:sldMk cId="1176146369" sldId="268"/>
+        </pc:sldMkLst>
+        <pc:spChg chg="mod">
+          <ac:chgData name="Eoin Rafferty" userId="a35ed0867f933026" providerId="LiveId" clId="{972C1A0A-D0B9-4A51-81B4-F7220E8F5A00}" dt="2020-07-17T08:46:58.474" v="868" actId="1076"/>
+          <ac:spMkLst>
+            <pc:docMk/>
+            <pc:sldMk cId="1176146369" sldId="268"/>
+            <ac:spMk id="2" creationId="{A96F30E6-600E-405C-A753-F49C6E946159}"/>
+          </ac:spMkLst>
+        </pc:spChg>
+        <pc:spChg chg="mod">
+          <ac:chgData name="Eoin Rafferty" userId="a35ed0867f933026" providerId="LiveId" clId="{972C1A0A-D0B9-4A51-81B4-F7220E8F5A00}" dt="2020-07-17T08:49:14.716" v="879" actId="20577"/>
+          <ac:spMkLst>
+            <pc:docMk/>
+            <pc:sldMk cId="1176146369" sldId="268"/>
+            <ac:spMk id="3" creationId="{AED06332-B4B2-4715-86FA-CE6E4A5D6B84}"/>
+          </ac:spMkLst>
+        </pc:spChg>
+        <pc:spChg chg="add">
+          <ac:chgData name="Eoin Rafferty" userId="a35ed0867f933026" providerId="LiveId" clId="{972C1A0A-D0B9-4A51-81B4-F7220E8F5A00}" dt="2020-07-17T08:46:41.139" v="865" actId="26606"/>
+          <ac:spMkLst>
+            <pc:docMk/>
+            <pc:sldMk cId="1176146369" sldId="268"/>
+            <ac:spMk id="10" creationId="{F64BBAA4-C62B-4146-B49F-FE4CC4655EE0}"/>
+          </ac:spMkLst>
+        </pc:spChg>
+        <pc:spChg chg="add">
+          <ac:chgData name="Eoin Rafferty" userId="a35ed0867f933026" providerId="LiveId" clId="{972C1A0A-D0B9-4A51-81B4-F7220E8F5A00}" dt="2020-07-17T08:46:41.139" v="865" actId="26606"/>
+          <ac:spMkLst>
+            <pc:docMk/>
+            <pc:sldMk cId="1176146369" sldId="268"/>
+            <ac:spMk id="14" creationId="{6BF36B24-6632-4516-9692-731462896C1F}"/>
+          </ac:spMkLst>
+        </pc:spChg>
+        <pc:picChg chg="add del mod modCrop">
+          <ac:chgData name="Eoin Rafferty" userId="a35ed0867f933026" providerId="LiveId" clId="{972C1A0A-D0B9-4A51-81B4-F7220E8F5A00}" dt="2020-07-17T08:48:32.781" v="871" actId="478"/>
+          <ac:picMkLst>
+            <pc:docMk/>
+            <pc:sldMk cId="1176146369" sldId="268"/>
+            <ac:picMk id="5" creationId="{A5ADB6CE-C357-48EE-95B2-9B340055983F}"/>
+          </ac:picMkLst>
+        </pc:picChg>
+        <pc:picChg chg="add mod modCrop">
+          <ac:chgData name="Eoin Rafferty" userId="a35ed0867f933026" providerId="LiveId" clId="{972C1A0A-D0B9-4A51-81B4-F7220E8F5A00}" dt="2020-07-17T08:49:36.275" v="884" actId="1076"/>
+          <ac:picMkLst>
+            <pc:docMk/>
+            <pc:sldMk cId="1176146369" sldId="268"/>
+            <ac:picMk id="7" creationId="{6997164E-6F25-4D54-A43A-876691F7DC22}"/>
+          </ac:picMkLst>
+        </pc:picChg>
+        <pc:cxnChg chg="add">
+          <ac:chgData name="Eoin Rafferty" userId="a35ed0867f933026" providerId="LiveId" clId="{972C1A0A-D0B9-4A51-81B4-F7220E8F5A00}" dt="2020-07-17T08:46:41.139" v="865" actId="26606"/>
+          <ac:cxnSpMkLst>
+            <pc:docMk/>
+            <pc:sldMk cId="1176146369" sldId="268"/>
+            <ac:cxnSpMk id="12" creationId="{EEB57AA8-F021-480C-A9E2-F89913313611}"/>
+          </ac:cxnSpMkLst>
+        </pc:cxnChg>
       </pc:sldChg>
     </pc:docChg>
   </pc:docChgLst>
@@ -4172,7 +4369,7 @@
           <p:cNvPr id="2" name="Title 1">
             <a:extLst>
               <a:ext uri="{FF2B5EF4-FFF2-40B4-BE49-F238E27FC236}">
-                <a16:creationId xmlns:a16="http://schemas.microsoft.com/office/drawing/2014/main" id="{D7D33629-6D4B-41CB-8170-23E0454EFDDC}"/>
+                <a16:creationId xmlns:a16="http://schemas.microsoft.com/office/drawing/2014/main" id="{1354B8D7-B6AD-4D0B-8577-52F1520C1DF1}"/>
               </a:ext>
             </a:extLst>
           </p:cNvPr>
@@ -4183,63 +4380,113 @@
             <p:ph type="title"/>
           </p:nvPr>
         </p:nvSpPr>
+        <p:spPr>
+          <a:xfrm>
+            <a:off x="1097280" y="286603"/>
+            <a:ext cx="5408023" cy="1450757"/>
+          </a:xfrm>
+        </p:spPr>
+        <p:txBody>
+          <a:bodyPr/>
+          <a:lstStyle/>
+          <a:p>
+            <a:r>
+              <a:rPr lang="en-GB" dirty="0"/>
+              <a:t>Version Control System</a:t>
+            </a:r>
+          </a:p>
+        </p:txBody>
+      </p:sp>
+      <p:sp>
+        <p:nvSpPr>
+          <p:cNvPr id="3" name="Content Placeholder 2">
+            <a:extLst>
+              <a:ext uri="{FF2B5EF4-FFF2-40B4-BE49-F238E27FC236}">
+                <a16:creationId xmlns:a16="http://schemas.microsoft.com/office/drawing/2014/main" id="{0E7D01A9-B413-4413-81A5-ADE470F14259}"/>
+              </a:ext>
+            </a:extLst>
+          </p:cNvPr>
+          <p:cNvSpPr>
+            <a:spLocks noGrp="1"/>
+          </p:cNvSpPr>
+          <p:nvPr>
+            <p:ph idx="1"/>
+          </p:nvPr>
+        </p:nvSpPr>
         <p:spPr/>
         <p:txBody>
           <a:bodyPr/>
           <a:lstStyle/>
           <a:p>
-            <a:pPr algn="ctr"/>
-            <a:r>
-              <a:rPr lang="en-GB"/>
-              <a:t>Project Demonstration</a:t>
-            </a:r>
-            <a:endParaRPr lang="en-GB" dirty="0"/>
-          </a:p>
-        </p:txBody>
-      </p:sp>
-      <p:sp>
-        <p:nvSpPr>
-          <p:cNvPr id="3" name="Content Placeholder 2">
-            <a:extLst>
-              <a:ext uri="{FF2B5EF4-FFF2-40B4-BE49-F238E27FC236}">
-                <a16:creationId xmlns:a16="http://schemas.microsoft.com/office/drawing/2014/main" id="{8C354780-54D4-4492-A5F6-9183520234CE}"/>
-              </a:ext>
-            </a:extLst>
-          </p:cNvPr>
-          <p:cNvSpPr>
-            <a:spLocks noGrp="1"/>
-          </p:cNvSpPr>
-          <p:nvPr>
-            <p:ph idx="1"/>
-          </p:nvPr>
-        </p:nvSpPr>
-        <p:spPr/>
-        <p:txBody>
-          <a:bodyPr>
-            <a:normAutofit/>
-          </a:bodyPr>
-          <a:lstStyle/>
-          <a:p>
-            <a:pPr algn="ctr"/>
-            <a:r>
-              <a:rPr lang="en-GB" sz="2000" dirty="0"/>
-              <a:t>I will now take you through the functionality of the project. To summarise, we linked the JDBC to a </a:t>
-            </a:r>
-            <a:r>
-              <a:rPr lang="en-GB" sz="2000" dirty="0" err="1"/>
-              <a:t>MySql</a:t>
-            </a:r>
-            <a:r>
-              <a:rPr lang="en-GB" sz="2000" dirty="0"/>
-              <a:t> database to not only access the database but also to create, read, update and delete contents within the tables so that the user can control the inventory of their store. </a:t>
-            </a:r>
-          </a:p>
-        </p:txBody>
-      </p:sp>
+            <a:r>
+              <a:rPr lang="en-GB" dirty="0"/>
+              <a:t>Throughout the whole project it was essential I had a repository that contained all of the necessary files relating to the project.</a:t>
+            </a:r>
+          </a:p>
+          <a:p>
+            <a:r>
+              <a:rPr lang="en-GB" dirty="0"/>
+              <a:t>The VCS that was decided upon is the commonly used </a:t>
+            </a:r>
+            <a:r>
+              <a:rPr lang="en-GB" b="1" dirty="0"/>
+              <a:t>Git</a:t>
+            </a:r>
+            <a:r>
+              <a:rPr lang="en-GB" dirty="0"/>
+              <a:t>. Git allows me not only to edit my local machine but to push all of my work with commits to a cloud system named </a:t>
+            </a:r>
+            <a:r>
+              <a:rPr lang="en-GB" b="1" dirty="0"/>
+              <a:t>GitHub</a:t>
+            </a:r>
+            <a:r>
+              <a:rPr lang="en-GB" dirty="0"/>
+              <a:t>. </a:t>
+            </a:r>
+          </a:p>
+          <a:p>
+            <a:r>
+              <a:rPr lang="en-GB" dirty="0"/>
+              <a:t>This was ultimately essential not only for ease of use to showcase the project or if I intended to work on the project from a different device but also for project integrity meaning if I was to mistakenly edit any aspect of the project or code in an unintended way, I can just pull a previous commit with the file progress I made up until then.</a:t>
+            </a:r>
+          </a:p>
+        </p:txBody>
+      </p:sp>
+      <p:pic>
+        <p:nvPicPr>
+          <p:cNvPr id="4" name="Picture 3">
+            <a:extLst>
+              <a:ext uri="{FF2B5EF4-FFF2-40B4-BE49-F238E27FC236}">
+                <a16:creationId xmlns:a16="http://schemas.microsoft.com/office/drawing/2014/main" id="{41E11378-3876-4DF4-8AE1-A2097CBD88DE}"/>
+              </a:ext>
+            </a:extLst>
+          </p:cNvPr>
+          <p:cNvPicPr>
+            <a:picLocks noChangeAspect="1"/>
+          </p:cNvPicPr>
+          <p:nvPr/>
+        </p:nvPicPr>
+        <p:blipFill>
+          <a:blip r:embed="rId2"/>
+          <a:stretch>
+            <a:fillRect/>
+          </a:stretch>
+        </p:blipFill>
+        <p:spPr>
+          <a:xfrm>
+            <a:off x="7449136" y="356235"/>
+            <a:ext cx="3314700" cy="1381125"/>
+          </a:xfrm>
+          <a:prstGeom prst="rect">
+            <a:avLst/>
+          </a:prstGeom>
+        </p:spPr>
+      </p:pic>
     </p:spTree>
     <p:extLst>
       <p:ext uri="{BB962C8B-B14F-4D97-AF65-F5344CB8AC3E}">
-        <p14:creationId xmlns:p14="http://schemas.microsoft.com/office/powerpoint/2010/main" val="3854591744"/>
+        <p14:creationId xmlns:p14="http://schemas.microsoft.com/office/powerpoint/2010/main" val="881029316"/>
       </p:ext>
     </p:extLst>
   </p:cSld>
@@ -4252,6 +4499,18 @@
 <file path=ppt/slides/slide11.xml><?xml version="1.0" encoding="utf-8"?>
 <p:sld xmlns:a="http://schemas.openxmlformats.org/drawingml/2006/main" xmlns:r="http://schemas.openxmlformats.org/officeDocument/2006/relationships" xmlns:p="http://schemas.openxmlformats.org/presentationml/2006/main">
   <p:cSld>
+    <p:bg>
+      <p:bgPr>
+        <a:solidFill>
+          <a:schemeClr val="bg2">
+            <a:tint val="90000"/>
+            <a:shade val="97000"/>
+            <a:satMod val="130000"/>
+          </a:schemeClr>
+        </a:solidFill>
+        <a:effectLst/>
+      </p:bgPr>
+    </p:bg>
     <p:spTree>
       <p:nvGrpSpPr>
         <p:cNvPr id="1" name=""/>
@@ -4268,9 +4527,363 @@
       </p:grpSpPr>
       <p:sp>
         <p:nvSpPr>
+          <p:cNvPr id="8" name="Rectangle 7">
+            <a:extLst>
+              <a:ext uri="{FF2B5EF4-FFF2-40B4-BE49-F238E27FC236}">
+                <a16:creationId xmlns:a16="http://schemas.microsoft.com/office/drawing/2014/main" id="{F5FE1B2C-7BC1-4AE2-9A50-2A4A70A9D6A1}"/>
+              </a:ext>
+              <a:ext uri="{C183D7F6-B498-43B3-948B-1728B52AA6E4}">
+                <adec:decorative xmlns:adec="http://schemas.microsoft.com/office/drawing/2017/decorative" val="1"/>
+              </a:ext>
+            </a:extLst>
+          </p:cNvPr>
+          <p:cNvSpPr>
+            <a:spLocks noGrp="1" noRot="1" noChangeAspect="1" noMove="1" noResize="1" noEditPoints="1" noAdjustHandles="1" noChangeArrowheads="1" noChangeShapeType="1" noTextEdit="1"/>
+          </p:cNvSpPr>
+          <p:nvPr>
+            <p:extLst>
+              <p:ext uri="{386F3935-93C4-4BCD-93E2-E3B085C9AB24}">
+                <p16:designElem xmlns:p16="http://schemas.microsoft.com/office/powerpoint/2015/main" val="1"/>
+              </p:ext>
+            </p:extLst>
+          </p:nvPr>
+        </p:nvSpPr>
+        <p:spPr>
+          <a:xfrm>
+            <a:off x="3048" y="0"/>
+            <a:ext cx="12188952" cy="6858000"/>
+          </a:xfrm>
+          <a:prstGeom prst="rect">
+            <a:avLst/>
+          </a:prstGeom>
+          <a:solidFill>
+            <a:schemeClr val="bg1"/>
+          </a:solidFill>
+          <a:ln>
+            <a:noFill/>
+          </a:ln>
+        </p:spPr>
+        <p:style>
+          <a:lnRef idx="2">
+            <a:schemeClr val="accent1">
+              <a:shade val="50000"/>
+            </a:schemeClr>
+          </a:lnRef>
+          <a:fillRef idx="1">
+            <a:schemeClr val="accent1"/>
+          </a:fillRef>
+          <a:effectRef idx="0">
+            <a:schemeClr val="accent1"/>
+          </a:effectRef>
+          <a:fontRef idx="minor">
+            <a:schemeClr val="lt1"/>
+          </a:fontRef>
+        </p:style>
+        <p:txBody>
+          <a:bodyPr rtlCol="0" anchor="ctr"/>
+          <a:lstStyle/>
+          <a:p>
+            <a:pPr algn="ctr"/>
+            <a:endParaRPr lang="en-US"/>
+          </a:p>
+        </p:txBody>
+      </p:sp>
+      <p:sp useBgFill="1">
+        <p:nvSpPr>
+          <p:cNvPr id="10" name="Rectangle 9">
+            <a:extLst>
+              <a:ext uri="{FF2B5EF4-FFF2-40B4-BE49-F238E27FC236}">
+                <a16:creationId xmlns:a16="http://schemas.microsoft.com/office/drawing/2014/main" id="{97E8244A-2C81-4C0E-A929-3EC8EFF35564}"/>
+              </a:ext>
+              <a:ext uri="{C183D7F6-B498-43B3-948B-1728B52AA6E4}">
+                <adec:decorative xmlns:adec="http://schemas.microsoft.com/office/drawing/2017/decorative" val="1"/>
+              </a:ext>
+            </a:extLst>
+          </p:cNvPr>
+          <p:cNvSpPr>
+            <a:spLocks noGrp="1" noRot="1" noChangeAspect="1" noMove="1" noResize="1" noEditPoints="1" noAdjustHandles="1" noChangeArrowheads="1" noChangeShapeType="1" noTextEdit="1"/>
+          </p:cNvSpPr>
+          <p:nvPr>
+            <p:extLst>
+              <p:ext uri="{386F3935-93C4-4BCD-93E2-E3B085C9AB24}">
+                <p16:designElem xmlns:p16="http://schemas.microsoft.com/office/powerpoint/2015/main" val="1"/>
+              </p:ext>
+            </p:extLst>
+          </p:nvPr>
+        </p:nvSpPr>
+        <p:spPr bwMode="ltGray">
+          <a:xfrm>
+            <a:off x="458724" y="457200"/>
+            <a:ext cx="11274552" cy="5943600"/>
+          </a:xfrm>
+          <a:prstGeom prst="rect">
+            <a:avLst/>
+          </a:prstGeom>
+          <a:ln w="127000" cap="sq" cmpd="thinThick">
+            <a:noFill/>
+          </a:ln>
+        </p:spPr>
+        <p:style>
+          <a:lnRef idx="2">
+            <a:schemeClr val="accent1">
+              <a:shade val="50000"/>
+            </a:schemeClr>
+          </a:lnRef>
+          <a:fillRef idx="1">
+            <a:schemeClr val="accent1"/>
+          </a:fillRef>
+          <a:effectRef idx="0">
+            <a:schemeClr val="accent1"/>
+          </a:effectRef>
+          <a:fontRef idx="minor">
+            <a:schemeClr val="lt1"/>
+          </a:fontRef>
+        </p:style>
+        <p:txBody>
+          <a:bodyPr rtlCol="0" anchor="ctr"/>
+          <a:lstStyle/>
+          <a:p>
+            <a:pPr algn="ctr"/>
+            <a:endParaRPr lang="en-US"/>
+          </a:p>
+        </p:txBody>
+      </p:sp>
+      <p:sp>
+        <p:nvSpPr>
           <p:cNvPr id="2" name="Title 1">
             <a:extLst>
               <a:ext uri="{FF2B5EF4-FFF2-40B4-BE49-F238E27FC236}">
+                <a16:creationId xmlns:a16="http://schemas.microsoft.com/office/drawing/2014/main" id="{D7D33629-6D4B-41CB-8170-23E0454EFDDC}"/>
+              </a:ext>
+            </a:extLst>
+          </p:cNvPr>
+          <p:cNvSpPr>
+            <a:spLocks noGrp="1"/>
+          </p:cNvSpPr>
+          <p:nvPr>
+            <p:ph type="title"/>
+          </p:nvPr>
+        </p:nvSpPr>
+        <p:spPr>
+          <a:xfrm>
+            <a:off x="858749" y="963997"/>
+            <a:ext cx="3787457" cy="4938361"/>
+          </a:xfrm>
+        </p:spPr>
+        <p:txBody>
+          <a:bodyPr anchor="ctr">
+            <a:normAutofit/>
+          </a:bodyPr>
+          <a:lstStyle/>
+          <a:p>
+            <a:pPr algn="r"/>
+            <a:r>
+              <a:rPr lang="en-GB"/>
+              <a:t>Project Demonstration</a:t>
+            </a:r>
+          </a:p>
+        </p:txBody>
+      </p:sp>
+      <p:cxnSp>
+        <p:nvCxnSpPr>
+          <p:cNvPr id="12" name="Straight Connector 11">
+            <a:extLst>
+              <a:ext uri="{FF2B5EF4-FFF2-40B4-BE49-F238E27FC236}">
+                <a16:creationId xmlns:a16="http://schemas.microsoft.com/office/drawing/2014/main" id="{02CC3441-26B3-4381-B3DF-8AE3C288BC0D}"/>
+              </a:ext>
+              <a:ext uri="{C183D7F6-B498-43B3-948B-1728B52AA6E4}">
+                <adec:decorative xmlns:adec="http://schemas.microsoft.com/office/drawing/2017/decorative" val="1"/>
+              </a:ext>
+            </a:extLst>
+          </p:cNvPr>
+          <p:cNvCxnSpPr>
+            <a:cxnSpLocks noGrp="1" noRot="1" noChangeAspect="1" noMove="1" noResize="1" noEditPoints="1" noAdjustHandles="1" noChangeArrowheads="1" noChangeShapeType="1"/>
+          </p:cNvCxnSpPr>
+          <p:nvPr>
+            <p:extLst>
+              <p:ext uri="{386F3935-93C4-4BCD-93E2-E3B085C9AB24}">
+                <p16:designElem xmlns:p16="http://schemas.microsoft.com/office/powerpoint/2015/main" val="1"/>
+              </p:ext>
+            </p:extLst>
+          </p:nvPr>
+        </p:nvCxnSpPr>
+        <p:spPr>
+          <a:xfrm>
+            <a:off x="4971974" y="2057399"/>
+            <a:ext cx="0" cy="2743200"/>
+          </a:xfrm>
+          <a:prstGeom prst="line">
+            <a:avLst/>
+          </a:prstGeom>
+          <a:ln w="19050">
+            <a:solidFill>
+              <a:schemeClr val="tx2"/>
+            </a:solidFill>
+          </a:ln>
+        </p:spPr>
+        <p:style>
+          <a:lnRef idx="1">
+            <a:schemeClr val="accent1"/>
+          </a:lnRef>
+          <a:fillRef idx="0">
+            <a:schemeClr val="accent1"/>
+          </a:fillRef>
+          <a:effectRef idx="0">
+            <a:schemeClr val="accent1"/>
+          </a:effectRef>
+          <a:fontRef idx="minor">
+            <a:schemeClr val="tx1"/>
+          </a:fontRef>
+        </p:style>
+      </p:cxnSp>
+      <p:sp>
+        <p:nvSpPr>
+          <p:cNvPr id="3" name="Content Placeholder 2">
+            <a:extLst>
+              <a:ext uri="{FF2B5EF4-FFF2-40B4-BE49-F238E27FC236}">
+                <a16:creationId xmlns:a16="http://schemas.microsoft.com/office/drawing/2014/main" id="{8C354780-54D4-4492-A5F6-9183520234CE}"/>
+              </a:ext>
+            </a:extLst>
+          </p:cNvPr>
+          <p:cNvSpPr>
+            <a:spLocks noGrp="1"/>
+          </p:cNvSpPr>
+          <p:nvPr>
+            <p:ph idx="1"/>
+          </p:nvPr>
+        </p:nvSpPr>
+        <p:spPr>
+          <a:xfrm>
+            <a:off x="5301798" y="963507"/>
+            <a:ext cx="5968181" cy="4938851"/>
+          </a:xfrm>
+        </p:spPr>
+        <p:txBody>
+          <a:bodyPr anchor="ctr">
+            <a:normAutofit/>
+          </a:bodyPr>
+          <a:lstStyle/>
+          <a:p>
+            <a:r>
+              <a:rPr lang="en-GB"/>
+              <a:t>I will now take you through the functionality of the project. To summarise, we linked the JDBC to a </a:t>
+            </a:r>
+            <a:r>
+              <a:rPr lang="en-GB" err="1"/>
+              <a:t>MySql</a:t>
+            </a:r>
+            <a:r>
+              <a:rPr lang="en-GB"/>
+              <a:t> database to not only access the database but also to create, read, update and delete contents within the tables so that the user can control the inventory of their store. </a:t>
+            </a:r>
+          </a:p>
+        </p:txBody>
+      </p:sp>
+    </p:spTree>
+    <p:extLst>
+      <p:ext uri="{BB962C8B-B14F-4D97-AF65-F5344CB8AC3E}">
+        <p14:creationId xmlns:p14="http://schemas.microsoft.com/office/powerpoint/2010/main" val="3854591744"/>
+      </p:ext>
+    </p:extLst>
+  </p:cSld>
+  <p:clrMapOvr>
+    <a:masterClrMapping/>
+  </p:clrMapOvr>
+</p:sld>
+</file>
+
+<file path=ppt/slides/slide12.xml><?xml version="1.0" encoding="utf-8"?>
+<p:sld xmlns:a="http://schemas.openxmlformats.org/drawingml/2006/main" xmlns:r="http://schemas.openxmlformats.org/officeDocument/2006/relationships" xmlns:p="http://schemas.openxmlformats.org/presentationml/2006/main">
+  <p:cSld>
+    <p:bg>
+      <p:bgPr>
+        <a:solidFill>
+          <a:schemeClr val="bg1">
+            <a:lumMod val="75000"/>
+          </a:schemeClr>
+        </a:solidFill>
+        <a:effectLst/>
+      </p:bgPr>
+    </p:bg>
+    <p:spTree>
+      <p:nvGrpSpPr>
+        <p:cNvPr id="1" name=""/>
+        <p:cNvGrpSpPr/>
+        <p:nvPr/>
+      </p:nvGrpSpPr>
+      <p:grpSpPr>
+        <a:xfrm>
+          <a:off x="0" y="0"/>
+          <a:ext cx="0" cy="0"/>
+          <a:chOff x="0" y="0"/>
+          <a:chExt cx="0" cy="0"/>
+        </a:xfrm>
+      </p:grpSpPr>
+      <p:sp useBgFill="1">
+        <p:nvSpPr>
+          <p:cNvPr id="71" name="Rectangle 70">
+            <a:extLst>
+              <a:ext uri="{FF2B5EF4-FFF2-40B4-BE49-F238E27FC236}">
+                <a16:creationId xmlns:a16="http://schemas.microsoft.com/office/drawing/2014/main" id="{13BCCAE5-A35B-4B66-A4A7-E23C34A403A4}"/>
+              </a:ext>
+              <a:ext uri="{C183D7F6-B498-43B3-948B-1728B52AA6E4}">
+                <adec:decorative xmlns:adec="http://schemas.microsoft.com/office/drawing/2017/decorative" val="1"/>
+              </a:ext>
+            </a:extLst>
+          </p:cNvPr>
+          <p:cNvSpPr>
+            <a:spLocks noGrp="1" noRot="1" noChangeAspect="1" noMove="1" noResize="1" noEditPoints="1" noAdjustHandles="1" noChangeArrowheads="1" noChangeShapeType="1" noTextEdit="1"/>
+          </p:cNvSpPr>
+          <p:nvPr>
+            <p:extLst>
+              <p:ext uri="{386F3935-93C4-4BCD-93E2-E3B085C9AB24}">
+                <p16:designElem xmlns:p16="http://schemas.microsoft.com/office/powerpoint/2015/main" val="1"/>
+              </p:ext>
+            </p:extLst>
+          </p:nvPr>
+        </p:nvSpPr>
+        <p:spPr>
+          <a:xfrm>
+            <a:off x="0" y="0"/>
+            <a:ext cx="12192000" cy="6858000"/>
+          </a:xfrm>
+          <a:prstGeom prst="rect">
+            <a:avLst/>
+          </a:prstGeom>
+          <a:ln>
+            <a:noFill/>
+          </a:ln>
+        </p:spPr>
+        <p:style>
+          <a:lnRef idx="2">
+            <a:schemeClr val="accent1">
+              <a:shade val="50000"/>
+            </a:schemeClr>
+          </a:lnRef>
+          <a:fillRef idx="1">
+            <a:schemeClr val="accent1"/>
+          </a:fillRef>
+          <a:effectRef idx="0">
+            <a:schemeClr val="accent1"/>
+          </a:effectRef>
+          <a:fontRef idx="minor">
+            <a:schemeClr val="lt1"/>
+          </a:fontRef>
+        </p:style>
+        <p:txBody>
+          <a:bodyPr rtlCol="0" anchor="ctr"/>
+          <a:lstStyle/>
+          <a:p>
+            <a:pPr algn="ctr"/>
+            <a:endParaRPr lang="en-US"/>
+          </a:p>
+        </p:txBody>
+      </p:sp>
+      <p:sp>
+        <p:nvSpPr>
+          <p:cNvPr id="2" name="Title 1">
+            <a:extLst>
+              <a:ext uri="{FF2B5EF4-FFF2-40B4-BE49-F238E27FC236}">
                 <a16:creationId xmlns:a16="http://schemas.microsoft.com/office/drawing/2014/main" id="{7D5EA7FA-F78C-478D-AA9A-99B6A83BEEFE}"/>
               </a:ext>
             </a:extLst>
@@ -4282,19 +4895,81 @@
             <p:ph type="title"/>
           </p:nvPr>
         </p:nvSpPr>
-        <p:spPr/>
-        <p:txBody>
-          <a:bodyPr/>
-          <a:lstStyle/>
-          <a:p>
-            <a:pPr algn="ctr"/>
+        <p:spPr>
+          <a:xfrm>
+            <a:off x="1097280" y="286603"/>
+            <a:ext cx="10058400" cy="1450757"/>
+          </a:xfrm>
+        </p:spPr>
+        <p:txBody>
+          <a:bodyPr>
+            <a:normAutofit/>
+          </a:bodyPr>
+          <a:lstStyle/>
+          <a:p>
             <a:r>
               <a:rPr lang="en-GB" dirty="0"/>
               <a:t>Testing</a:t>
             </a:r>
-          </a:p>
-        </p:txBody>
-      </p:sp>
+            <a:endParaRPr lang="en-GB"/>
+          </a:p>
+        </p:txBody>
+      </p:sp>
+      <p:cxnSp>
+        <p:nvCxnSpPr>
+          <p:cNvPr id="73" name="Straight Connector 72">
+            <a:extLst>
+              <a:ext uri="{FF2B5EF4-FFF2-40B4-BE49-F238E27FC236}">
+                <a16:creationId xmlns:a16="http://schemas.microsoft.com/office/drawing/2014/main" id="{6987BDFB-DE64-4B56-B44F-45FAE19FA94E}"/>
+              </a:ext>
+              <a:ext uri="{C183D7F6-B498-43B3-948B-1728B52AA6E4}">
+                <adec:decorative xmlns:adec="http://schemas.microsoft.com/office/drawing/2017/decorative" val="1"/>
+              </a:ext>
+            </a:extLst>
+          </p:cNvPr>
+          <p:cNvCxnSpPr>
+            <a:cxnSpLocks noGrp="1" noRot="1" noChangeAspect="1" noMove="1" noResize="1" noEditPoints="1" noAdjustHandles="1" noChangeArrowheads="1" noChangeShapeType="1"/>
+          </p:cNvCxnSpPr>
+          <p:nvPr>
+            <p:extLst>
+              <p:ext uri="{386F3935-93C4-4BCD-93E2-E3B085C9AB24}">
+                <p16:designElem xmlns:p16="http://schemas.microsoft.com/office/powerpoint/2015/main" val="1"/>
+              </p:ext>
+            </p:extLst>
+          </p:nvPr>
+        </p:nvCxnSpPr>
+        <p:spPr>
+          <a:xfrm>
+            <a:off x="1193532" y="1895846"/>
+            <a:ext cx="9966960" cy="0"/>
+          </a:xfrm>
+          <a:prstGeom prst="line">
+            <a:avLst/>
+          </a:prstGeom>
+          <a:ln w="12700">
+            <a:solidFill>
+              <a:schemeClr val="tx1">
+                <a:lumMod val="75000"/>
+                <a:lumOff val="25000"/>
+              </a:schemeClr>
+            </a:solidFill>
+          </a:ln>
+        </p:spPr>
+        <p:style>
+          <a:lnRef idx="1">
+            <a:schemeClr val="accent1"/>
+          </a:lnRef>
+          <a:fillRef idx="0">
+            <a:schemeClr val="accent1"/>
+          </a:fillRef>
+          <a:effectRef idx="0">
+            <a:schemeClr val="accent1"/>
+          </a:effectRef>
+          <a:fontRef idx="minor">
+            <a:schemeClr val="tx1"/>
+          </a:fontRef>
+        </p:style>
+      </p:cxnSp>
       <p:sp>
         <p:nvSpPr>
           <p:cNvPr id="3" name="Content Placeholder 2">
@@ -4311,23 +4986,30 @@
             <p:ph idx="1"/>
           </p:nvPr>
         </p:nvSpPr>
-        <p:spPr/>
-        <p:txBody>
-          <a:bodyPr/>
-          <a:lstStyle/>
-          <a:p>
-            <a:pPr algn="ctr"/>
+        <p:spPr>
+          <a:xfrm>
+            <a:off x="1097280" y="2108201"/>
+            <a:ext cx="6437367" cy="3760891"/>
+          </a:xfrm>
+        </p:spPr>
+        <p:txBody>
+          <a:bodyPr>
+            <a:normAutofit/>
+          </a:bodyPr>
+          <a:lstStyle/>
+          <a:p>
             <a:r>
               <a:rPr lang="en-GB" dirty="0"/>
               <a:t>Following the completion of the JDBC, I began the testing of the project. For this it was decided upon the use of Junit testing as the programme was built using Maven. The industry standard of 80% was the goal but unfortunately I fell short at 75% due to the project being my first venture with practical Java and Junit testing.</a:t>
             </a:r>
-          </a:p>
-          <a:p>
-            <a:pPr algn="ctr"/>
+            <a:endParaRPr lang="en-GB"/>
+          </a:p>
+          <a:p>
             <a:r>
               <a:rPr lang="en-GB" dirty="0"/>
               <a:t>I will now take you through a variety of my test cases and the logic behind them.</a:t>
             </a:r>
+            <a:endParaRPr lang="en-GB"/>
           </a:p>
         </p:txBody>
       </p:sp>
@@ -4353,15 +5035,14 @@
               </a:ext>
             </a:extLst>
           </a:blip>
-          <a:srcRect/>
           <a:stretch>
             <a:fillRect/>
           </a:stretch>
         </p:blipFill>
         <p:spPr bwMode="auto">
           <a:xfrm>
-            <a:off x="289728" y="4250695"/>
-            <a:ext cx="1989238" cy="1989238"/>
+            <a:off x="8129006" y="2416624"/>
+            <a:ext cx="3144043" cy="3144043"/>
           </a:xfrm>
           <a:prstGeom prst="rect">
             <a:avLst/>
@@ -4378,6 +5059,61 @@
           </a:extLst>
         </p:spPr>
       </p:pic>
+      <p:sp>
+        <p:nvSpPr>
+          <p:cNvPr id="75" name="Rectangle 74">
+            <a:extLst>
+              <a:ext uri="{FF2B5EF4-FFF2-40B4-BE49-F238E27FC236}">
+                <a16:creationId xmlns:a16="http://schemas.microsoft.com/office/drawing/2014/main" id="{CB06839E-D8C3-4A74-BA2B-3B97E7B2CDB5}"/>
+              </a:ext>
+              <a:ext uri="{C183D7F6-B498-43B3-948B-1728B52AA6E4}">
+                <adec:decorative xmlns:adec="http://schemas.microsoft.com/office/drawing/2017/decorative" val="1"/>
+              </a:ext>
+            </a:extLst>
+          </p:cNvPr>
+          <p:cNvSpPr>
+            <a:spLocks noGrp="1" noRot="1" noChangeAspect="1" noMove="1" noResize="1" noEditPoints="1" noAdjustHandles="1" noChangeArrowheads="1" noChangeShapeType="1" noTextEdit="1"/>
+          </p:cNvSpPr>
+          <p:nvPr>
+            <p:extLst>
+              <p:ext uri="{386F3935-93C4-4BCD-93E2-E3B085C9AB24}">
+                <p16:designElem xmlns:p16="http://schemas.microsoft.com/office/powerpoint/2015/main" val="1"/>
+              </p:ext>
+            </p:extLst>
+          </p:nvPr>
+        </p:nvSpPr>
+        <p:spPr>
+          <a:xfrm>
+            <a:off x="0" y="6400800"/>
+            <a:ext cx="12192000" cy="457200"/>
+          </a:xfrm>
+          <a:prstGeom prst="rect">
+            <a:avLst/>
+          </a:prstGeom>
+          <a:solidFill>
+            <a:srgbClr val="262626"/>
+          </a:solidFill>
+          <a:ln>
+            <a:noFill/>
+          </a:ln>
+        </p:spPr>
+        <p:style>
+          <a:lnRef idx="2">
+            <a:schemeClr val="accent1">
+              <a:shade val="50000"/>
+            </a:schemeClr>
+          </a:lnRef>
+          <a:fillRef idx="1">
+            <a:schemeClr val="accent1"/>
+          </a:fillRef>
+          <a:effectRef idx="0">
+            <a:schemeClr val="accent1"/>
+          </a:effectRef>
+          <a:fontRef idx="minor">
+            <a:schemeClr val="lt1"/>
+          </a:fontRef>
+        </p:style>
+      </p:sp>
     </p:spTree>
     <p:extLst>
       <p:ext uri="{BB962C8B-B14F-4D97-AF65-F5344CB8AC3E}">
@@ -4391,7 +5127,7 @@
 </p:sld>
 </file>
 
-<file path=ppt/slides/slide12.xml><?xml version="1.0" encoding="utf-8"?>
+<file path=ppt/slides/slide13.xml><?xml version="1.0" encoding="utf-8"?>
 <p:sld xmlns:a="http://schemas.openxmlformats.org/drawingml/2006/main" xmlns:r="http://schemas.openxmlformats.org/officeDocument/2006/relationships" xmlns:p="http://schemas.openxmlformats.org/presentationml/2006/main">
   <p:cSld>
     <p:spTree>
@@ -4500,7 +5236,9 @@
     <p:bg>
       <p:bgPr>
         <a:solidFill>
-          <a:schemeClr val="bg1"/>
+          <a:schemeClr val="bg1">
+            <a:lumMod val="75000"/>
+          </a:schemeClr>
         </a:solidFill>
         <a:effectLst/>
       </p:bgPr>
@@ -5788,6 +6526,14 @@
 <file path=ppt/slides/slide6.xml><?xml version="1.0" encoding="utf-8"?>
 <p:sld xmlns:a="http://schemas.openxmlformats.org/drawingml/2006/main" xmlns:r="http://schemas.openxmlformats.org/officeDocument/2006/relationships" xmlns:p="http://schemas.openxmlformats.org/presentationml/2006/main">
   <p:cSld>
+    <p:bg>
+      <p:bgPr>
+        <a:solidFill>
+          <a:schemeClr val="bg1"/>
+        </a:solidFill>
+        <a:effectLst/>
+      </p:bgPr>
+    </p:bg>
     <p:spTree>
       <p:nvGrpSpPr>
         <p:cNvPr id="1" name=""/>
@@ -5802,12 +6548,72 @@
           <a:chExt cx="0" cy="0"/>
         </a:xfrm>
       </p:grpSpPr>
+      <p:sp useBgFill="1">
+        <p:nvSpPr>
+          <p:cNvPr id="10" name="Rectangle 9">
+            <a:extLst>
+              <a:ext uri="{FF2B5EF4-FFF2-40B4-BE49-F238E27FC236}">
+                <a16:creationId xmlns:a16="http://schemas.microsoft.com/office/drawing/2014/main" id="{F64BBAA4-C62B-4146-B49F-FE4CC4655EE0}"/>
+              </a:ext>
+              <a:ext uri="{C183D7F6-B498-43B3-948B-1728B52AA6E4}">
+                <adec:decorative xmlns:adec="http://schemas.microsoft.com/office/drawing/2017/decorative" val="1"/>
+              </a:ext>
+            </a:extLst>
+          </p:cNvPr>
+          <p:cNvSpPr>
+            <a:spLocks noGrp="1" noRot="1" noChangeAspect="1" noMove="1" noResize="1" noEditPoints="1" noAdjustHandles="1" noChangeArrowheads="1" noChangeShapeType="1" noTextEdit="1"/>
+          </p:cNvSpPr>
+          <p:nvPr>
+            <p:extLst>
+              <p:ext uri="{386F3935-93C4-4BCD-93E2-E3B085C9AB24}">
+                <p16:designElem xmlns:p16="http://schemas.microsoft.com/office/powerpoint/2015/main" val="1"/>
+              </p:ext>
+            </p:extLst>
+          </p:nvPr>
+        </p:nvSpPr>
+        <p:spPr>
+          <a:xfrm>
+            <a:off x="0" y="0"/>
+            <a:ext cx="12192001" cy="6858000"/>
+          </a:xfrm>
+          <a:prstGeom prst="rect">
+            <a:avLst/>
+          </a:prstGeom>
+          <a:ln>
+            <a:noFill/>
+          </a:ln>
+        </p:spPr>
+        <p:style>
+          <a:lnRef idx="2">
+            <a:schemeClr val="accent1">
+              <a:shade val="50000"/>
+            </a:schemeClr>
+          </a:lnRef>
+          <a:fillRef idx="1">
+            <a:schemeClr val="accent1"/>
+          </a:fillRef>
+          <a:effectRef idx="0">
+            <a:schemeClr val="accent1"/>
+          </a:effectRef>
+          <a:fontRef idx="minor">
+            <a:schemeClr val="lt1"/>
+          </a:fontRef>
+        </p:style>
+        <p:txBody>
+          <a:bodyPr rtlCol="0" anchor="ctr"/>
+          <a:lstStyle/>
+          <a:p>
+            <a:pPr algn="ctr"/>
+            <a:endParaRPr lang="en-US"/>
+          </a:p>
+        </p:txBody>
+      </p:sp>
       <p:sp>
         <p:nvSpPr>
           <p:cNvPr id="2" name="Title 1">
             <a:extLst>
               <a:ext uri="{FF2B5EF4-FFF2-40B4-BE49-F238E27FC236}">
-                <a16:creationId xmlns:a16="http://schemas.microsoft.com/office/drawing/2014/main" id="{26EE2BD2-49AA-4153-838B-EA25527699A6}"/>
+                <a16:creationId xmlns:a16="http://schemas.microsoft.com/office/drawing/2014/main" id="{A96F30E6-600E-405C-A753-F49C6E946159}"/>
               </a:ext>
             </a:extLst>
           </p:cNvPr>
@@ -5818,67 +6624,176 @@
             <p:ph type="title"/>
           </p:nvPr>
         </p:nvSpPr>
-        <p:spPr/>
-        <p:txBody>
-          <a:bodyPr/>
+        <p:spPr>
+          <a:xfrm>
+            <a:off x="851709" y="643469"/>
+            <a:ext cx="3177847" cy="1674180"/>
+          </a:xfrm>
+        </p:spPr>
+        <p:txBody>
+          <a:bodyPr>
+            <a:normAutofit/>
+          </a:bodyPr>
+          <a:lstStyle/>
+          <a:p>
+            <a:r>
+              <a:rPr lang="en-GB" sz="4000" dirty="0"/>
+              <a:t>Project foundations</a:t>
+            </a:r>
+          </a:p>
+        </p:txBody>
+      </p:sp>
+      <p:cxnSp>
+        <p:nvCxnSpPr>
+          <p:cNvPr id="12" name="Straight Connector 11">
+            <a:extLst>
+              <a:ext uri="{FF2B5EF4-FFF2-40B4-BE49-F238E27FC236}">
+                <a16:creationId xmlns:a16="http://schemas.microsoft.com/office/drawing/2014/main" id="{EEB57AA8-F021-480C-A9E2-F89913313611}"/>
+              </a:ext>
+              <a:ext uri="{C183D7F6-B498-43B3-948B-1728B52AA6E4}">
+                <adec:decorative xmlns:adec="http://schemas.microsoft.com/office/drawing/2017/decorative" val="1"/>
+              </a:ext>
+            </a:extLst>
+          </p:cNvPr>
+          <p:cNvCxnSpPr>
+            <a:cxnSpLocks noGrp="1" noRot="1" noChangeAspect="1" noMove="1" noResize="1" noEditPoints="1" noAdjustHandles="1" noChangeArrowheads="1" noChangeShapeType="1"/>
+          </p:cNvCxnSpPr>
+          <p:nvPr>
+            <p:extLst>
+              <p:ext uri="{386F3935-93C4-4BCD-93E2-E3B085C9AB24}">
+                <p16:designElem xmlns:p16="http://schemas.microsoft.com/office/powerpoint/2015/main" val="1"/>
+              </p:ext>
+            </p:extLst>
+          </p:nvPr>
+        </p:nvCxnSpPr>
+        <p:spPr>
+          <a:xfrm>
+            <a:off x="962164" y="2478513"/>
+            <a:ext cx="2926080" cy="0"/>
+          </a:xfrm>
+          <a:prstGeom prst="line">
+            <a:avLst/>
+          </a:prstGeom>
+          <a:ln>
+            <a:solidFill>
+              <a:schemeClr val="tx1">
+                <a:lumMod val="75000"/>
+                <a:lumOff val="25000"/>
+              </a:schemeClr>
+            </a:solidFill>
+          </a:ln>
+        </p:spPr>
+        <p:style>
+          <a:lnRef idx="1">
+            <a:schemeClr val="accent1"/>
+          </a:lnRef>
+          <a:fillRef idx="0">
+            <a:schemeClr val="accent1"/>
+          </a:fillRef>
+          <a:effectRef idx="0">
+            <a:schemeClr val="accent1"/>
+          </a:effectRef>
+          <a:fontRef idx="minor">
+            <a:schemeClr val="tx1"/>
+          </a:fontRef>
+        </p:style>
+      </p:cxnSp>
+      <p:sp>
+        <p:nvSpPr>
+          <p:cNvPr id="3" name="Content Placeholder 2">
+            <a:extLst>
+              <a:ext uri="{FF2B5EF4-FFF2-40B4-BE49-F238E27FC236}">
+                <a16:creationId xmlns:a16="http://schemas.microsoft.com/office/drawing/2014/main" id="{AED06332-B4B2-4715-86FA-CE6E4A5D6B84}"/>
+              </a:ext>
+            </a:extLst>
+          </p:cNvPr>
+          <p:cNvSpPr>
+            <a:spLocks noGrp="1"/>
+          </p:cNvSpPr>
+          <p:nvPr>
+            <p:ph idx="1"/>
+          </p:nvPr>
+        </p:nvSpPr>
+        <p:spPr>
+          <a:xfrm>
+            <a:off x="858064" y="2639380"/>
+            <a:ext cx="3205049" cy="3229714"/>
+          </a:xfrm>
+        </p:spPr>
+        <p:txBody>
+          <a:bodyPr>
+            <a:normAutofit/>
+          </a:bodyPr>
           <a:lstStyle/>
           <a:p>
             <a:r>
               <a:rPr lang="en-GB" dirty="0"/>
-              <a:t>Project foundations</a:t>
-            </a:r>
-          </a:p>
-        </p:txBody>
-      </p:sp>
-      <p:sp>
-        <p:nvSpPr>
-          <p:cNvPr id="3" name="Content Placeholder 2">
-            <a:extLst>
-              <a:ext uri="{FF2B5EF4-FFF2-40B4-BE49-F238E27FC236}">
-                <a16:creationId xmlns:a16="http://schemas.microsoft.com/office/drawing/2014/main" id="{D3553F12-196E-423C-B8DF-F1BC52D9A0DD}"/>
-              </a:ext>
-            </a:extLst>
-          </p:cNvPr>
-          <p:cNvSpPr>
-            <a:spLocks noGrp="1"/>
-          </p:cNvSpPr>
-          <p:nvPr>
-            <p:ph idx="1"/>
-          </p:nvPr>
-        </p:nvSpPr>
-        <p:spPr/>
-        <p:txBody>
-          <a:bodyPr/>
-          <a:lstStyle/>
-          <a:p>
-            <a:pPr algn="ctr"/>
-            <a:r>
-              <a:rPr lang="en-GB" dirty="0"/>
-              <a:t>Before I began with the project I brainstormed all the necessary things I had to do for the completion of a successful project. What I decided upon was a Kanban board specifically using Jira software. </a:t>
-            </a:r>
-          </a:p>
-          <a:p>
-            <a:pPr algn="ctr"/>
-            <a:r>
-              <a:rPr lang="en-GB" dirty="0"/>
-              <a:t>Jira gave me the ability to precisely plan out exactly what I had to do and work out the time  effort that would be needed for each task using an app named Planning Poker so I could create an estimate for the overall timeline of the project. </a:t>
-            </a:r>
-          </a:p>
-          <a:p>
-            <a:pPr algn="ctr"/>
-            <a:r>
-              <a:rPr lang="en-GB" dirty="0"/>
-              <a:t>On the following slide is what a completed task looked like on my Kanban board.</a:t>
-            </a:r>
-          </a:p>
-        </p:txBody>
+              <a:t>Before beginning the project, I developed a risk assessment for hurdles I may find during the development of the project  a long with proposed solutions.</a:t>
+            </a:r>
+          </a:p>
+        </p:txBody>
+      </p:sp>
+      <p:sp>
+        <p:nvSpPr>
+          <p:cNvPr id="14" name="Rectangle 13">
+            <a:extLst>
+              <a:ext uri="{FF2B5EF4-FFF2-40B4-BE49-F238E27FC236}">
+                <a16:creationId xmlns:a16="http://schemas.microsoft.com/office/drawing/2014/main" id="{6BF36B24-6632-4516-9692-731462896C1F}"/>
+              </a:ext>
+              <a:ext uri="{C183D7F6-B498-43B3-948B-1728B52AA6E4}">
+                <adec:decorative xmlns:adec="http://schemas.microsoft.com/office/drawing/2017/decorative" val="1"/>
+              </a:ext>
+            </a:extLst>
+          </p:cNvPr>
+          <p:cNvSpPr>
+            <a:spLocks noGrp="1" noRot="1" noChangeAspect="1" noMove="1" noResize="1" noEditPoints="1" noAdjustHandles="1" noChangeArrowheads="1" noChangeShapeType="1" noTextEdit="1"/>
+          </p:cNvSpPr>
+          <p:nvPr>
+            <p:extLst>
+              <p:ext uri="{386F3935-93C4-4BCD-93E2-E3B085C9AB24}">
+                <p16:designElem xmlns:p16="http://schemas.microsoft.com/office/powerpoint/2015/main" val="1"/>
+              </p:ext>
+            </p:extLst>
+          </p:nvPr>
+        </p:nvSpPr>
+        <p:spPr>
+          <a:xfrm>
+            <a:off x="0" y="6400800"/>
+            <a:ext cx="12192000" cy="457200"/>
+          </a:xfrm>
+          <a:prstGeom prst="rect">
+            <a:avLst/>
+          </a:prstGeom>
+          <a:solidFill>
+            <a:srgbClr val="262626"/>
+          </a:solidFill>
+          <a:ln>
+            <a:noFill/>
+          </a:ln>
+        </p:spPr>
+        <p:style>
+          <a:lnRef idx="2">
+            <a:schemeClr val="accent1">
+              <a:shade val="50000"/>
+            </a:schemeClr>
+          </a:lnRef>
+          <a:fillRef idx="1">
+            <a:schemeClr val="accent1"/>
+          </a:fillRef>
+          <a:effectRef idx="0">
+            <a:schemeClr val="accent1"/>
+          </a:effectRef>
+          <a:fontRef idx="minor">
+            <a:schemeClr val="lt1"/>
+          </a:fontRef>
+        </p:style>
       </p:sp>
       <p:pic>
         <p:nvPicPr>
-          <p:cNvPr id="4" name="Picture 3">
-            <a:extLst>
-              <a:ext uri="{FF2B5EF4-FFF2-40B4-BE49-F238E27FC236}">
-                <a16:creationId xmlns:a16="http://schemas.microsoft.com/office/drawing/2014/main" id="{84B65E36-6E40-40D9-9BE4-B2701FE26A04}"/>
+          <p:cNvPr id="7" name="Picture 6">
+            <a:extLst>
+              <a:ext uri="{FF2B5EF4-FFF2-40B4-BE49-F238E27FC236}">
+                <a16:creationId xmlns:a16="http://schemas.microsoft.com/office/drawing/2014/main" id="{6997164E-6F25-4D54-A43A-876691F7DC22}"/>
               </a:ext>
             </a:extLst>
           </p:cNvPr>
@@ -5887,16 +6802,15 @@
           </p:cNvPicPr>
           <p:nvPr/>
         </p:nvPicPr>
-        <p:blipFill>
+        <p:blipFill rotWithShape="1">
           <a:blip r:embed="rId2"/>
-          <a:stretch>
-            <a:fillRect/>
-          </a:stretch>
+          <a:srcRect l="12462" t="11879" r="13692" b="9363"/>
+          <a:stretch/>
         </p:blipFill>
         <p:spPr>
           <a:xfrm>
-            <a:off x="7117960" y="369783"/>
-            <a:ext cx="3695700" cy="1238250"/>
+            <a:off x="3888244" y="866653"/>
+            <a:ext cx="8171930" cy="4900076"/>
           </a:xfrm>
           <a:prstGeom prst="rect">
             <a:avLst/>
@@ -5906,7 +6820,7 @@
     </p:spTree>
     <p:extLst>
       <p:ext uri="{BB962C8B-B14F-4D97-AF65-F5344CB8AC3E}">
-        <p14:creationId xmlns:p14="http://schemas.microsoft.com/office/powerpoint/2010/main" val="162083524"/>
+        <p14:creationId xmlns:p14="http://schemas.microsoft.com/office/powerpoint/2010/main" val="1176146369"/>
       </p:ext>
     </p:extLst>
   </p:cSld>
@@ -5935,270 +6849,99 @@
       </p:grpSpPr>
       <p:sp>
         <p:nvSpPr>
-          <p:cNvPr id="10" name="Rectangle 9">
-            <a:extLst>
-              <a:ext uri="{FF2B5EF4-FFF2-40B4-BE49-F238E27FC236}">
-                <a16:creationId xmlns:a16="http://schemas.microsoft.com/office/drawing/2014/main" id="{A8E9C91B-7EAD-4562-AB0E-DFB9663AECE3}"/>
-              </a:ext>
-              <a:ext uri="{C183D7F6-B498-43B3-948B-1728B52AA6E4}">
-                <adec:decorative xmlns:adec="http://schemas.microsoft.com/office/drawing/2017/decorative" val="1"/>
-              </a:ext>
-            </a:extLst>
-          </p:cNvPr>
-          <p:cNvSpPr>
-            <a:spLocks noGrp="1" noRot="1" noChangeAspect="1" noMove="1" noResize="1" noEditPoints="1" noAdjustHandles="1" noChangeArrowheads="1" noChangeShapeType="1" noTextEdit="1"/>
-          </p:cNvSpPr>
-          <p:nvPr>
-            <p:extLst>
-              <p:ext uri="{386F3935-93C4-4BCD-93E2-E3B085C9AB24}">
-                <p16:designElem xmlns:p16="http://schemas.microsoft.com/office/powerpoint/2015/main" val="1"/>
-              </p:ext>
-            </p:extLst>
-          </p:nvPr>
-        </p:nvSpPr>
-        <p:spPr>
-          <a:xfrm>
-            <a:off x="3175" y="6400800"/>
-            <a:ext cx="12188825" cy="457200"/>
-          </a:xfrm>
-          <a:prstGeom prst="rect">
-            <a:avLst/>
-          </a:prstGeom>
-          <a:solidFill>
-            <a:srgbClr val="262626"/>
-          </a:solidFill>
-          <a:ln>
-            <a:noFill/>
-          </a:ln>
-        </p:spPr>
-        <p:style>
-          <a:lnRef idx="2">
-            <a:schemeClr val="accent1">
-              <a:shade val="50000"/>
-            </a:schemeClr>
-          </a:lnRef>
-          <a:fillRef idx="1">
-            <a:schemeClr val="accent1"/>
-          </a:fillRef>
-          <a:effectRef idx="0">
-            <a:schemeClr val="accent1"/>
-          </a:effectRef>
-          <a:fontRef idx="minor">
-            <a:schemeClr val="lt1"/>
-          </a:fontRef>
-        </p:style>
-      </p:sp>
-      <p:sp>
-        <p:nvSpPr>
-          <p:cNvPr id="12" name="Rectangle 11">
-            <a:extLst>
-              <a:ext uri="{FF2B5EF4-FFF2-40B4-BE49-F238E27FC236}">
-                <a16:creationId xmlns:a16="http://schemas.microsoft.com/office/drawing/2014/main" id="{41497DE5-0939-4D1D-9350-0C5E1B209C68}"/>
-              </a:ext>
-              <a:ext uri="{C183D7F6-B498-43B3-948B-1728B52AA6E4}">
-                <adec:decorative xmlns:adec="http://schemas.microsoft.com/office/drawing/2017/decorative" val="1"/>
-              </a:ext>
-            </a:extLst>
-          </p:cNvPr>
-          <p:cNvSpPr>
-            <a:spLocks noGrp="1" noRot="1" noChangeAspect="1" noMove="1" noResize="1" noEditPoints="1" noAdjustHandles="1" noChangeArrowheads="1" noChangeShapeType="1" noTextEdit="1"/>
-          </p:cNvSpPr>
-          <p:nvPr>
-            <p:extLst>
-              <p:ext uri="{386F3935-93C4-4BCD-93E2-E3B085C9AB24}">
-                <p16:designElem xmlns:p16="http://schemas.microsoft.com/office/powerpoint/2015/main" val="1"/>
-              </p:ext>
-            </p:extLst>
-          </p:nvPr>
-        </p:nvSpPr>
-        <p:spPr>
-          <a:xfrm>
-            <a:off x="0" y="0"/>
-            <a:ext cx="12192000" cy="6858000"/>
-          </a:xfrm>
-          <a:prstGeom prst="rect">
-            <a:avLst/>
-          </a:prstGeom>
-          <a:solidFill>
-            <a:srgbClr val="262626"/>
-          </a:solidFill>
-          <a:ln>
-            <a:noFill/>
-          </a:ln>
-        </p:spPr>
-        <p:style>
-          <a:lnRef idx="2">
-            <a:schemeClr val="accent1">
-              <a:shade val="50000"/>
-            </a:schemeClr>
-          </a:lnRef>
-          <a:fillRef idx="1">
-            <a:schemeClr val="accent1"/>
-          </a:fillRef>
-          <a:effectRef idx="0">
-            <a:schemeClr val="accent1"/>
-          </a:effectRef>
-          <a:fontRef idx="minor">
-            <a:schemeClr val="lt1"/>
-          </a:fontRef>
-        </p:style>
-        <p:txBody>
-          <a:bodyPr rtlCol="0" anchor="ctr"/>
+          <p:cNvPr id="2" name="Title 1">
+            <a:extLst>
+              <a:ext uri="{FF2B5EF4-FFF2-40B4-BE49-F238E27FC236}">
+                <a16:creationId xmlns:a16="http://schemas.microsoft.com/office/drawing/2014/main" id="{26EE2BD2-49AA-4153-838B-EA25527699A6}"/>
+              </a:ext>
+            </a:extLst>
+          </p:cNvPr>
+          <p:cNvSpPr>
+            <a:spLocks noGrp="1"/>
+          </p:cNvSpPr>
+          <p:nvPr>
+            <p:ph type="title"/>
+          </p:nvPr>
+        </p:nvSpPr>
+        <p:spPr/>
+        <p:txBody>
+          <a:bodyPr/>
+          <a:lstStyle/>
+          <a:p>
+            <a:r>
+              <a:rPr lang="en-GB" dirty="0"/>
+              <a:t>Project foundations cont.</a:t>
+            </a:r>
+          </a:p>
+        </p:txBody>
+      </p:sp>
+      <p:sp>
+        <p:nvSpPr>
+          <p:cNvPr id="3" name="Content Placeholder 2">
+            <a:extLst>
+              <a:ext uri="{FF2B5EF4-FFF2-40B4-BE49-F238E27FC236}">
+                <a16:creationId xmlns:a16="http://schemas.microsoft.com/office/drawing/2014/main" id="{D3553F12-196E-423C-B8DF-F1BC52D9A0DD}"/>
+              </a:ext>
+            </a:extLst>
+          </p:cNvPr>
+          <p:cNvSpPr>
+            <a:spLocks noGrp="1"/>
+          </p:cNvSpPr>
+          <p:nvPr>
+            <p:ph idx="1"/>
+          </p:nvPr>
+        </p:nvSpPr>
+        <p:spPr/>
+        <p:txBody>
+          <a:bodyPr/>
           <a:lstStyle/>
           <a:p>
             <a:pPr algn="ctr"/>
-            <a:endParaRPr lang="en-US"/>
-          </a:p>
-        </p:txBody>
-      </p:sp>
-      <p:sp>
-        <p:nvSpPr>
-          <p:cNvPr id="14" name="Rectangle 13">
-            <a:extLst>
-              <a:ext uri="{FF2B5EF4-FFF2-40B4-BE49-F238E27FC236}">
-                <a16:creationId xmlns:a16="http://schemas.microsoft.com/office/drawing/2014/main" id="{5CCC70ED-6C63-4537-B7EB-51990D6C0A6F}"/>
-              </a:ext>
-              <a:ext uri="{C183D7F6-B498-43B3-948B-1728B52AA6E4}">
-                <adec:decorative xmlns:adec="http://schemas.microsoft.com/office/drawing/2017/decorative" val="1"/>
-              </a:ext>
-            </a:extLst>
-          </p:cNvPr>
-          <p:cNvSpPr>
-            <a:spLocks noGrp="1" noRot="1" noChangeAspect="1" noMove="1" noResize="1" noEditPoints="1" noAdjustHandles="1" noChangeArrowheads="1" noChangeShapeType="1" noTextEdit="1"/>
-          </p:cNvSpPr>
-          <p:nvPr>
-            <p:extLst>
-              <p:ext uri="{386F3935-93C4-4BCD-93E2-E3B085C9AB24}">
-                <p16:designElem xmlns:p16="http://schemas.microsoft.com/office/powerpoint/2015/main" val="1"/>
-              </p:ext>
-            </p:extLst>
-          </p:nvPr>
-        </p:nvSpPr>
-        <p:spPr>
-          <a:xfrm>
-            <a:off x="458724" y="457200"/>
-            <a:ext cx="11274552" cy="5943600"/>
-          </a:xfrm>
-          <a:prstGeom prst="rect">
-            <a:avLst/>
-          </a:prstGeom>
-          <a:ln>
-            <a:noFill/>
-          </a:ln>
-        </p:spPr>
-        <p:style>
-          <a:lnRef idx="2">
-            <a:schemeClr val="accent1">
-              <a:shade val="50000"/>
-            </a:schemeClr>
-          </a:lnRef>
-          <a:fillRef idx="1">
-            <a:schemeClr val="accent1"/>
-          </a:fillRef>
-          <a:effectRef idx="0">
-            <a:schemeClr val="accent1"/>
-          </a:effectRef>
-          <a:fontRef idx="minor">
-            <a:schemeClr val="lt1"/>
-          </a:fontRef>
-        </p:style>
-        <p:txBody>
-          <a:bodyPr rtlCol="0" anchor="ctr"/>
-          <a:lstStyle/>
+            <a:r>
+              <a:rPr lang="en-GB" dirty="0"/>
+              <a:t>Following the initial risk assessment, I brainstormed all the necessary things I had to do for the completion of a successful project. What I decided upon was a Kanban board specifically using Jira software. </a:t>
+            </a:r>
+          </a:p>
           <a:p>
             <a:pPr algn="ctr"/>
-            <a:endParaRPr lang="en-US"/>
-          </a:p>
-        </p:txBody>
-      </p:sp>
-      <p:sp>
-        <p:nvSpPr>
-          <p:cNvPr id="16" name="Rectangle 15">
-            <a:extLst>
-              <a:ext uri="{FF2B5EF4-FFF2-40B4-BE49-F238E27FC236}">
-                <a16:creationId xmlns:a16="http://schemas.microsoft.com/office/drawing/2014/main" id="{B76E24C1-2968-40DC-A36E-F6B85F0F0752}"/>
-              </a:ext>
-              <a:ext uri="{C183D7F6-B498-43B3-948B-1728B52AA6E4}">
-                <adec:decorative xmlns:adec="http://schemas.microsoft.com/office/drawing/2017/decorative" val="1"/>
-              </a:ext>
-            </a:extLst>
-          </p:cNvPr>
-          <p:cNvSpPr>
-            <a:spLocks noGrp="1" noRot="1" noChangeAspect="1" noMove="1" noResize="1" noEditPoints="1" noAdjustHandles="1" noChangeArrowheads="1" noChangeShapeType="1" noTextEdit="1"/>
-          </p:cNvSpPr>
-          <p:nvPr>
-            <p:extLst>
-              <p:ext uri="{386F3935-93C4-4BCD-93E2-E3B085C9AB24}">
-                <p16:designElem xmlns:p16="http://schemas.microsoft.com/office/powerpoint/2015/main" val="1"/>
-              </p:ext>
-            </p:extLst>
-          </p:nvPr>
-        </p:nvSpPr>
-        <p:spPr>
-          <a:xfrm>
-            <a:off x="522732" y="521208"/>
-            <a:ext cx="11146536" cy="5815584"/>
-          </a:xfrm>
-          <a:prstGeom prst="rect">
-            <a:avLst/>
-          </a:prstGeom>
-          <a:solidFill>
-            <a:srgbClr val="FFFFFF"/>
-          </a:solidFill>
-          <a:ln>
-            <a:noFill/>
-          </a:ln>
-        </p:spPr>
-        <p:style>
-          <a:lnRef idx="2">
-            <a:schemeClr val="accent1">
-              <a:shade val="50000"/>
-            </a:schemeClr>
-          </a:lnRef>
-          <a:fillRef idx="1">
-            <a:schemeClr val="accent1"/>
-          </a:fillRef>
-          <a:effectRef idx="0">
-            <a:schemeClr val="accent1"/>
-          </a:effectRef>
-          <a:fontRef idx="minor">
-            <a:schemeClr val="lt1"/>
-          </a:fontRef>
-        </p:style>
-        <p:txBody>
-          <a:bodyPr rtlCol="0" anchor="ctr"/>
-          <a:lstStyle/>
+            <a:r>
+              <a:rPr lang="en-GB" dirty="0"/>
+              <a:t>Jira gave me the ability to precisely plan out exactly what I had to do and work out the time  effort that would be needed for each task using an app named Planning Poker so I could create an estimate for the overall timeline of the project. </a:t>
+            </a:r>
+          </a:p>
           <a:p>
             <a:pPr algn="ctr"/>
-            <a:endParaRPr lang="en-US"/>
+            <a:r>
+              <a:rPr lang="en-GB" dirty="0"/>
+              <a:t>On the following slide is what a completed task looked like on my Kanban board.</a:t>
+            </a:r>
           </a:p>
         </p:txBody>
       </p:sp>
       <p:pic>
         <p:nvPicPr>
-          <p:cNvPr id="5" name="Content Placeholder 4">
-            <a:extLst>
-              <a:ext uri="{FF2B5EF4-FFF2-40B4-BE49-F238E27FC236}">
-                <a16:creationId xmlns:a16="http://schemas.microsoft.com/office/drawing/2014/main" id="{34B83370-79ED-4CA8-BFEA-D5EBB9AB8049}"/>
+          <p:cNvPr id="4" name="Picture 3">
+            <a:extLst>
+              <a:ext uri="{FF2B5EF4-FFF2-40B4-BE49-F238E27FC236}">
+                <a16:creationId xmlns:a16="http://schemas.microsoft.com/office/drawing/2014/main" id="{84B65E36-6E40-40D9-9BE4-B2701FE26A04}"/>
               </a:ext>
             </a:extLst>
           </p:cNvPr>
           <p:cNvPicPr>
-            <a:picLocks noGrp="1" noChangeAspect="1"/>
+            <a:picLocks noChangeAspect="1"/>
           </p:cNvPicPr>
-          <p:nvPr>
-            <p:ph idx="1"/>
-          </p:nvPr>
+          <p:nvPr/>
         </p:nvPicPr>
-        <p:blipFill rotWithShape="1">
+        <p:blipFill>
           <a:blip r:embed="rId2"/>
-          <a:srcRect l="16711" t="40329" r="466" b="4102"/>
-          <a:stretch/>
+          <a:stretch>
+            <a:fillRect/>
+          </a:stretch>
         </p:blipFill>
         <p:spPr>
           <a:xfrm>
-            <a:off x="648496" y="1373102"/>
-            <a:ext cx="10895008" cy="4111797"/>
+            <a:off x="7117960" y="369783"/>
+            <a:ext cx="3695700" cy="1238250"/>
           </a:xfrm>
           <a:prstGeom prst="rect">
             <a:avLst/>
@@ -6208,7 +6951,7 @@
     </p:spTree>
     <p:extLst>
       <p:ext uri="{BB962C8B-B14F-4D97-AF65-F5344CB8AC3E}">
-        <p14:creationId xmlns:p14="http://schemas.microsoft.com/office/powerpoint/2010/main" val="653779101"/>
+        <p14:creationId xmlns:p14="http://schemas.microsoft.com/office/powerpoint/2010/main" val="162083524"/>
       </p:ext>
     </p:extLst>
   </p:cSld>
@@ -6235,12 +6978,12 @@
           <a:chExt cx="0" cy="0"/>
         </a:xfrm>
       </p:grpSpPr>
-      <p:sp useBgFill="1">
-        <p:nvSpPr>
-          <p:cNvPr id="31" name="Rectangle 30">
-            <a:extLst>
-              <a:ext uri="{FF2B5EF4-FFF2-40B4-BE49-F238E27FC236}">
-                <a16:creationId xmlns:a16="http://schemas.microsoft.com/office/drawing/2014/main" id="{873ECEC8-0F24-45B8-950F-35FC94BCEAC8}"/>
+      <p:sp>
+        <p:nvSpPr>
+          <p:cNvPr id="10" name="Rectangle 9">
+            <a:extLst>
+              <a:ext uri="{FF2B5EF4-FFF2-40B4-BE49-F238E27FC236}">
+                <a16:creationId xmlns:a16="http://schemas.microsoft.com/office/drawing/2014/main" id="{A8E9C91B-7EAD-4562-AB0E-DFB9663AECE3}"/>
               </a:ext>
               <a:ext uri="{C183D7F6-B498-43B3-948B-1728B52AA6E4}">
                 <adec:decorative xmlns:adec="http://schemas.microsoft.com/office/drawing/2017/decorative" val="1"/>
@@ -6260,233 +7003,8 @@
         </p:nvSpPr>
         <p:spPr>
           <a:xfrm>
-            <a:off x="0" y="0"/>
-            <a:ext cx="12192001" cy="6858000"/>
-          </a:xfrm>
-          <a:prstGeom prst="rect">
-            <a:avLst/>
-          </a:prstGeom>
-          <a:ln>
-            <a:noFill/>
-          </a:ln>
-        </p:spPr>
-        <p:style>
-          <a:lnRef idx="2">
-            <a:schemeClr val="accent1">
-              <a:shade val="50000"/>
-            </a:schemeClr>
-          </a:lnRef>
-          <a:fillRef idx="1">
-            <a:schemeClr val="accent1"/>
-          </a:fillRef>
-          <a:effectRef idx="0">
-            <a:schemeClr val="accent1"/>
-          </a:effectRef>
-          <a:fontRef idx="minor">
-            <a:schemeClr val="lt1"/>
-          </a:fontRef>
-        </p:style>
-        <p:txBody>
-          <a:bodyPr rtlCol="0" anchor="ctr"/>
-          <a:lstStyle/>
-          <a:p>
-            <a:pPr algn="ctr"/>
-            <a:endParaRPr lang="en-US"/>
-          </a:p>
-        </p:txBody>
-      </p:sp>
-      <p:sp>
-        <p:nvSpPr>
-          <p:cNvPr id="2" name="Title 1">
-            <a:extLst>
-              <a:ext uri="{FF2B5EF4-FFF2-40B4-BE49-F238E27FC236}">
-                <a16:creationId xmlns:a16="http://schemas.microsoft.com/office/drawing/2014/main" id="{EB51D193-8A1D-4CC4-A6FE-7B0DDE7E54EA}"/>
-              </a:ext>
-            </a:extLst>
-          </p:cNvPr>
-          <p:cNvSpPr>
-            <a:spLocks noGrp="1"/>
-          </p:cNvSpPr>
-          <p:nvPr>
-            <p:ph type="title"/>
-          </p:nvPr>
-        </p:nvSpPr>
-        <p:spPr>
-          <a:xfrm>
-            <a:off x="7859485" y="634946"/>
-            <a:ext cx="3690257" cy="1450757"/>
-          </a:xfrm>
-        </p:spPr>
-        <p:txBody>
-          <a:bodyPr>
-            <a:normAutofit/>
-          </a:bodyPr>
-          <a:lstStyle/>
-          <a:p>
-            <a:r>
-              <a:rPr lang="en-GB"/>
-              <a:t>Database beginning</a:t>
-            </a:r>
-          </a:p>
-        </p:txBody>
-      </p:sp>
-      <p:pic>
-        <p:nvPicPr>
-          <p:cNvPr id="5" name="Picture 4" descr="A close up of a map&#10;&#10;Description automatically generated">
-            <a:extLst>
-              <a:ext uri="{FF2B5EF4-FFF2-40B4-BE49-F238E27FC236}">
-                <a16:creationId xmlns:a16="http://schemas.microsoft.com/office/drawing/2014/main" id="{3E489E06-1DE6-4D99-8CE8-639968D30F19}"/>
-              </a:ext>
-            </a:extLst>
-          </p:cNvPr>
-          <p:cNvPicPr>
-            <a:picLocks noChangeAspect="1"/>
-          </p:cNvPicPr>
-          <p:nvPr/>
-        </p:nvPicPr>
-        <p:blipFill rotWithShape="1">
-          <a:blip r:embed="rId2">
-            <a:extLst>
-              <a:ext uri="{28A0092B-C50C-407E-A947-70E740481C1C}">
-                <a14:useLocalDpi xmlns:a14="http://schemas.microsoft.com/office/drawing/2010/main" val="0"/>
-              </a:ext>
-            </a:extLst>
-          </a:blip>
-          <a:srcRect l="4110"/>
-          <a:stretch/>
-        </p:blipFill>
-        <p:spPr>
-          <a:xfrm>
-            <a:off x="633999" y="640081"/>
-            <a:ext cx="6909801" cy="5314406"/>
-          </a:xfrm>
-          <a:prstGeom prst="rect">
-            <a:avLst/>
-          </a:prstGeom>
-        </p:spPr>
-      </p:pic>
-      <p:cxnSp>
-        <p:nvCxnSpPr>
-          <p:cNvPr id="33" name="Straight Connector 32">
-            <a:extLst>
-              <a:ext uri="{FF2B5EF4-FFF2-40B4-BE49-F238E27FC236}">
-                <a16:creationId xmlns:a16="http://schemas.microsoft.com/office/drawing/2014/main" id="{89EB8C68-FF1B-4849-867B-32D29B19F102}"/>
-              </a:ext>
-              <a:ext uri="{C183D7F6-B498-43B3-948B-1728B52AA6E4}">
-                <adec:decorative xmlns:adec="http://schemas.microsoft.com/office/drawing/2017/decorative" val="1"/>
-              </a:ext>
-            </a:extLst>
-          </p:cNvPr>
-          <p:cNvCxnSpPr>
-            <a:cxnSpLocks noGrp="1" noRot="1" noChangeAspect="1" noMove="1" noResize="1" noEditPoints="1" noAdjustHandles="1" noChangeArrowheads="1" noChangeShapeType="1"/>
-          </p:cNvCxnSpPr>
-          <p:nvPr>
-            <p:extLst>
-              <p:ext uri="{386F3935-93C4-4BCD-93E2-E3B085C9AB24}">
-                <p16:designElem xmlns:p16="http://schemas.microsoft.com/office/powerpoint/2015/main" val="1"/>
-              </p:ext>
-            </p:extLst>
-          </p:nvPr>
-        </p:nvCxnSpPr>
-        <p:spPr>
-          <a:xfrm>
-            <a:off x="7942633" y="2250460"/>
-            <a:ext cx="3474720" cy="0"/>
-          </a:xfrm>
-          <a:prstGeom prst="line">
-            <a:avLst/>
-          </a:prstGeom>
-          <a:ln w="12700">
-            <a:solidFill>
-              <a:schemeClr val="tx1">
-                <a:lumMod val="75000"/>
-                <a:lumOff val="25000"/>
-              </a:schemeClr>
-            </a:solidFill>
-          </a:ln>
-        </p:spPr>
-        <p:style>
-          <a:lnRef idx="1">
-            <a:schemeClr val="accent1"/>
-          </a:lnRef>
-          <a:fillRef idx="0">
-            <a:schemeClr val="accent1"/>
-          </a:fillRef>
-          <a:effectRef idx="0">
-            <a:schemeClr val="accent1"/>
-          </a:effectRef>
-          <a:fontRef idx="minor">
-            <a:schemeClr val="tx1"/>
-          </a:fontRef>
-        </p:style>
-      </p:cxnSp>
-      <p:sp>
-        <p:nvSpPr>
-          <p:cNvPr id="3" name="Content Placeholder 2">
-            <a:extLst>
-              <a:ext uri="{FF2B5EF4-FFF2-40B4-BE49-F238E27FC236}">
-                <a16:creationId xmlns:a16="http://schemas.microsoft.com/office/drawing/2014/main" id="{486E80D6-371F-4EB2-80BD-C4E5799131E4}"/>
-              </a:ext>
-            </a:extLst>
-          </p:cNvPr>
-          <p:cNvSpPr>
-            <a:spLocks noGrp="1"/>
-          </p:cNvSpPr>
-          <p:nvPr>
-            <p:ph idx="1"/>
-          </p:nvPr>
-        </p:nvSpPr>
-        <p:spPr>
-          <a:xfrm>
-            <a:off x="7859485" y="2407436"/>
-            <a:ext cx="3690257" cy="3461658"/>
-          </a:xfrm>
-        </p:spPr>
-        <p:txBody>
-          <a:bodyPr>
-            <a:normAutofit/>
-          </a:bodyPr>
-          <a:lstStyle/>
-          <a:p>
-            <a:pPr>
-              <a:lnSpc>
-                <a:spcPct val="110000"/>
-              </a:lnSpc>
-            </a:pPr>
-            <a:r>
-              <a:rPr lang="en-GB"/>
-              <a:t>Once I had Jira completed I began the tasks required. This began with the development of necessary tables I will be using throughout the project. After the tables and columns were decided upon, I created an ERD for the tables. The ERD essentially shows the relationships between the tables in the database.</a:t>
-            </a:r>
-          </a:p>
-        </p:txBody>
-      </p:sp>
-      <p:sp>
-        <p:nvSpPr>
-          <p:cNvPr id="35" name="Rectangle 34">
-            <a:extLst>
-              <a:ext uri="{FF2B5EF4-FFF2-40B4-BE49-F238E27FC236}">
-                <a16:creationId xmlns:a16="http://schemas.microsoft.com/office/drawing/2014/main" id="{8B53612E-ADB2-4457-9688-89506397AF28}"/>
-              </a:ext>
-              <a:ext uri="{C183D7F6-B498-43B3-948B-1728B52AA6E4}">
-                <adec:decorative xmlns:adec="http://schemas.microsoft.com/office/drawing/2017/decorative" val="1"/>
-              </a:ext>
-            </a:extLst>
-          </p:cNvPr>
-          <p:cNvSpPr>
-            <a:spLocks noGrp="1" noRot="1" noChangeAspect="1" noMove="1" noResize="1" noEditPoints="1" noAdjustHandles="1" noChangeArrowheads="1" noChangeShapeType="1" noTextEdit="1"/>
-          </p:cNvSpPr>
-          <p:nvPr>
-            <p:extLst>
-              <p:ext uri="{386F3935-93C4-4BCD-93E2-E3B085C9AB24}">
-                <p16:designElem xmlns:p16="http://schemas.microsoft.com/office/powerpoint/2015/main" val="1"/>
-              </p:ext>
-            </p:extLst>
-          </p:nvPr>
-        </p:nvSpPr>
-        <p:spPr>
-          <a:xfrm>
-            <a:off x="1" y="6400800"/>
-            <a:ext cx="12192000" cy="457200"/>
+            <a:off x="3175" y="6400800"/>
+            <a:ext cx="12188825" cy="457200"/>
           </a:xfrm>
           <a:prstGeom prst="rect">
             <a:avLst/>
@@ -6515,10 +7033,227 @@
           </a:fontRef>
         </p:style>
       </p:sp>
+      <p:sp>
+        <p:nvSpPr>
+          <p:cNvPr id="12" name="Rectangle 11">
+            <a:extLst>
+              <a:ext uri="{FF2B5EF4-FFF2-40B4-BE49-F238E27FC236}">
+                <a16:creationId xmlns:a16="http://schemas.microsoft.com/office/drawing/2014/main" id="{41497DE5-0939-4D1D-9350-0C5E1B209C68}"/>
+              </a:ext>
+              <a:ext uri="{C183D7F6-B498-43B3-948B-1728B52AA6E4}">
+                <adec:decorative xmlns:adec="http://schemas.microsoft.com/office/drawing/2017/decorative" val="1"/>
+              </a:ext>
+            </a:extLst>
+          </p:cNvPr>
+          <p:cNvSpPr>
+            <a:spLocks noGrp="1" noRot="1" noChangeAspect="1" noMove="1" noResize="1" noEditPoints="1" noAdjustHandles="1" noChangeArrowheads="1" noChangeShapeType="1" noTextEdit="1"/>
+          </p:cNvSpPr>
+          <p:nvPr>
+            <p:extLst>
+              <p:ext uri="{386F3935-93C4-4BCD-93E2-E3B085C9AB24}">
+                <p16:designElem xmlns:p16="http://schemas.microsoft.com/office/powerpoint/2015/main" val="1"/>
+              </p:ext>
+            </p:extLst>
+          </p:nvPr>
+        </p:nvSpPr>
+        <p:spPr>
+          <a:xfrm>
+            <a:off x="0" y="0"/>
+            <a:ext cx="12192000" cy="6858000"/>
+          </a:xfrm>
+          <a:prstGeom prst="rect">
+            <a:avLst/>
+          </a:prstGeom>
+          <a:solidFill>
+            <a:srgbClr val="262626"/>
+          </a:solidFill>
+          <a:ln>
+            <a:noFill/>
+          </a:ln>
+        </p:spPr>
+        <p:style>
+          <a:lnRef idx="2">
+            <a:schemeClr val="accent1">
+              <a:shade val="50000"/>
+            </a:schemeClr>
+          </a:lnRef>
+          <a:fillRef idx="1">
+            <a:schemeClr val="accent1"/>
+          </a:fillRef>
+          <a:effectRef idx="0">
+            <a:schemeClr val="accent1"/>
+          </a:effectRef>
+          <a:fontRef idx="minor">
+            <a:schemeClr val="lt1"/>
+          </a:fontRef>
+        </p:style>
+        <p:txBody>
+          <a:bodyPr rtlCol="0" anchor="ctr"/>
+          <a:lstStyle/>
+          <a:p>
+            <a:pPr algn="ctr"/>
+            <a:endParaRPr lang="en-US"/>
+          </a:p>
+        </p:txBody>
+      </p:sp>
+      <p:sp>
+        <p:nvSpPr>
+          <p:cNvPr id="14" name="Rectangle 13">
+            <a:extLst>
+              <a:ext uri="{FF2B5EF4-FFF2-40B4-BE49-F238E27FC236}">
+                <a16:creationId xmlns:a16="http://schemas.microsoft.com/office/drawing/2014/main" id="{5CCC70ED-6C63-4537-B7EB-51990D6C0A6F}"/>
+              </a:ext>
+              <a:ext uri="{C183D7F6-B498-43B3-948B-1728B52AA6E4}">
+                <adec:decorative xmlns:adec="http://schemas.microsoft.com/office/drawing/2017/decorative" val="1"/>
+              </a:ext>
+            </a:extLst>
+          </p:cNvPr>
+          <p:cNvSpPr>
+            <a:spLocks noGrp="1" noRot="1" noChangeAspect="1" noMove="1" noResize="1" noEditPoints="1" noAdjustHandles="1" noChangeArrowheads="1" noChangeShapeType="1" noTextEdit="1"/>
+          </p:cNvSpPr>
+          <p:nvPr>
+            <p:extLst>
+              <p:ext uri="{386F3935-93C4-4BCD-93E2-E3B085C9AB24}">
+                <p16:designElem xmlns:p16="http://schemas.microsoft.com/office/powerpoint/2015/main" val="1"/>
+              </p:ext>
+            </p:extLst>
+          </p:nvPr>
+        </p:nvSpPr>
+        <p:spPr>
+          <a:xfrm>
+            <a:off x="458724" y="457200"/>
+            <a:ext cx="11274552" cy="5943600"/>
+          </a:xfrm>
+          <a:prstGeom prst="rect">
+            <a:avLst/>
+          </a:prstGeom>
+          <a:ln>
+            <a:noFill/>
+          </a:ln>
+        </p:spPr>
+        <p:style>
+          <a:lnRef idx="2">
+            <a:schemeClr val="accent1">
+              <a:shade val="50000"/>
+            </a:schemeClr>
+          </a:lnRef>
+          <a:fillRef idx="1">
+            <a:schemeClr val="accent1"/>
+          </a:fillRef>
+          <a:effectRef idx="0">
+            <a:schemeClr val="accent1"/>
+          </a:effectRef>
+          <a:fontRef idx="minor">
+            <a:schemeClr val="lt1"/>
+          </a:fontRef>
+        </p:style>
+        <p:txBody>
+          <a:bodyPr rtlCol="0" anchor="ctr"/>
+          <a:lstStyle/>
+          <a:p>
+            <a:pPr algn="ctr"/>
+            <a:endParaRPr lang="en-US"/>
+          </a:p>
+        </p:txBody>
+      </p:sp>
+      <p:sp>
+        <p:nvSpPr>
+          <p:cNvPr id="16" name="Rectangle 15">
+            <a:extLst>
+              <a:ext uri="{FF2B5EF4-FFF2-40B4-BE49-F238E27FC236}">
+                <a16:creationId xmlns:a16="http://schemas.microsoft.com/office/drawing/2014/main" id="{B76E24C1-2968-40DC-A36E-F6B85F0F0752}"/>
+              </a:ext>
+              <a:ext uri="{C183D7F6-B498-43B3-948B-1728B52AA6E4}">
+                <adec:decorative xmlns:adec="http://schemas.microsoft.com/office/drawing/2017/decorative" val="1"/>
+              </a:ext>
+            </a:extLst>
+          </p:cNvPr>
+          <p:cNvSpPr>
+            <a:spLocks noGrp="1" noRot="1" noChangeAspect="1" noMove="1" noResize="1" noEditPoints="1" noAdjustHandles="1" noChangeArrowheads="1" noChangeShapeType="1" noTextEdit="1"/>
+          </p:cNvSpPr>
+          <p:nvPr>
+            <p:extLst>
+              <p:ext uri="{386F3935-93C4-4BCD-93E2-E3B085C9AB24}">
+                <p16:designElem xmlns:p16="http://schemas.microsoft.com/office/powerpoint/2015/main" val="1"/>
+              </p:ext>
+            </p:extLst>
+          </p:nvPr>
+        </p:nvSpPr>
+        <p:spPr>
+          <a:xfrm>
+            <a:off x="522732" y="521208"/>
+            <a:ext cx="11146536" cy="5815584"/>
+          </a:xfrm>
+          <a:prstGeom prst="rect">
+            <a:avLst/>
+          </a:prstGeom>
+          <a:solidFill>
+            <a:srgbClr val="FFFFFF"/>
+          </a:solidFill>
+          <a:ln>
+            <a:noFill/>
+          </a:ln>
+        </p:spPr>
+        <p:style>
+          <a:lnRef idx="2">
+            <a:schemeClr val="accent1">
+              <a:shade val="50000"/>
+            </a:schemeClr>
+          </a:lnRef>
+          <a:fillRef idx="1">
+            <a:schemeClr val="accent1"/>
+          </a:fillRef>
+          <a:effectRef idx="0">
+            <a:schemeClr val="accent1"/>
+          </a:effectRef>
+          <a:fontRef idx="minor">
+            <a:schemeClr val="lt1"/>
+          </a:fontRef>
+        </p:style>
+        <p:txBody>
+          <a:bodyPr rtlCol="0" anchor="ctr"/>
+          <a:lstStyle/>
+          <a:p>
+            <a:pPr algn="ctr"/>
+            <a:endParaRPr lang="en-US"/>
+          </a:p>
+        </p:txBody>
+      </p:sp>
+      <p:pic>
+        <p:nvPicPr>
+          <p:cNvPr id="5" name="Content Placeholder 4">
+            <a:extLst>
+              <a:ext uri="{FF2B5EF4-FFF2-40B4-BE49-F238E27FC236}">
+                <a16:creationId xmlns:a16="http://schemas.microsoft.com/office/drawing/2014/main" id="{34B83370-79ED-4CA8-BFEA-D5EBB9AB8049}"/>
+              </a:ext>
+            </a:extLst>
+          </p:cNvPr>
+          <p:cNvPicPr>
+            <a:picLocks noGrp="1" noChangeAspect="1"/>
+          </p:cNvPicPr>
+          <p:nvPr>
+            <p:ph idx="1"/>
+          </p:nvPr>
+        </p:nvPicPr>
+        <p:blipFill rotWithShape="1">
+          <a:blip r:embed="rId2"/>
+          <a:srcRect l="16711" t="40329" r="466" b="4102"/>
+          <a:stretch/>
+        </p:blipFill>
+        <p:spPr>
+          <a:xfrm>
+            <a:off x="648496" y="1373102"/>
+            <a:ext cx="10895008" cy="4111797"/>
+          </a:xfrm>
+          <a:prstGeom prst="rect">
+            <a:avLst/>
+          </a:prstGeom>
+        </p:spPr>
+      </p:pic>
     </p:spTree>
     <p:extLst>
       <p:ext uri="{BB962C8B-B14F-4D97-AF65-F5344CB8AC3E}">
-        <p14:creationId xmlns:p14="http://schemas.microsoft.com/office/powerpoint/2010/main" val="1207738877"/>
+        <p14:creationId xmlns:p14="http://schemas.microsoft.com/office/powerpoint/2010/main" val="653779101"/>
       </p:ext>
     </p:extLst>
   </p:cSld>
@@ -6545,12 +7280,72 @@
           <a:chExt cx="0" cy="0"/>
         </a:xfrm>
       </p:grpSpPr>
+      <p:sp useBgFill="1">
+        <p:nvSpPr>
+          <p:cNvPr id="31" name="Rectangle 30">
+            <a:extLst>
+              <a:ext uri="{FF2B5EF4-FFF2-40B4-BE49-F238E27FC236}">
+                <a16:creationId xmlns:a16="http://schemas.microsoft.com/office/drawing/2014/main" id="{873ECEC8-0F24-45B8-950F-35FC94BCEAC8}"/>
+              </a:ext>
+              <a:ext uri="{C183D7F6-B498-43B3-948B-1728B52AA6E4}">
+                <adec:decorative xmlns:adec="http://schemas.microsoft.com/office/drawing/2017/decorative" val="1"/>
+              </a:ext>
+            </a:extLst>
+          </p:cNvPr>
+          <p:cNvSpPr>
+            <a:spLocks noGrp="1" noRot="1" noChangeAspect="1" noMove="1" noResize="1" noEditPoints="1" noAdjustHandles="1" noChangeArrowheads="1" noChangeShapeType="1" noTextEdit="1"/>
+          </p:cNvSpPr>
+          <p:nvPr>
+            <p:extLst>
+              <p:ext uri="{386F3935-93C4-4BCD-93E2-E3B085C9AB24}">
+                <p16:designElem xmlns:p16="http://schemas.microsoft.com/office/powerpoint/2015/main" val="1"/>
+              </p:ext>
+            </p:extLst>
+          </p:nvPr>
+        </p:nvSpPr>
+        <p:spPr>
+          <a:xfrm>
+            <a:off x="0" y="0"/>
+            <a:ext cx="12192001" cy="6858000"/>
+          </a:xfrm>
+          <a:prstGeom prst="rect">
+            <a:avLst/>
+          </a:prstGeom>
+          <a:ln>
+            <a:noFill/>
+          </a:ln>
+        </p:spPr>
+        <p:style>
+          <a:lnRef idx="2">
+            <a:schemeClr val="accent1">
+              <a:shade val="50000"/>
+            </a:schemeClr>
+          </a:lnRef>
+          <a:fillRef idx="1">
+            <a:schemeClr val="accent1"/>
+          </a:fillRef>
+          <a:effectRef idx="0">
+            <a:schemeClr val="accent1"/>
+          </a:effectRef>
+          <a:fontRef idx="minor">
+            <a:schemeClr val="lt1"/>
+          </a:fontRef>
+        </p:style>
+        <p:txBody>
+          <a:bodyPr rtlCol="0" anchor="ctr"/>
+          <a:lstStyle/>
+          <a:p>
+            <a:pPr algn="ctr"/>
+            <a:endParaRPr lang="en-US"/>
+          </a:p>
+        </p:txBody>
+      </p:sp>
       <p:sp>
         <p:nvSpPr>
           <p:cNvPr id="2" name="Title 1">
             <a:extLst>
               <a:ext uri="{FF2B5EF4-FFF2-40B4-BE49-F238E27FC236}">
-                <a16:creationId xmlns:a16="http://schemas.microsoft.com/office/drawing/2014/main" id="{1354B8D7-B6AD-4D0B-8577-52F1520C1DF1}"/>
+                <a16:creationId xmlns:a16="http://schemas.microsoft.com/office/drawing/2014/main" id="{EB51D193-8A1D-4CC4-A6FE-7B0DDE7E54EA}"/>
               </a:ext>
             </a:extLst>
           </p:cNvPr>
@@ -6563,83 +7358,29 @@
         </p:nvSpPr>
         <p:spPr>
           <a:xfrm>
-            <a:off x="1097280" y="286603"/>
-            <a:ext cx="5408023" cy="1450757"/>
-          </a:xfrm>
-        </p:spPr>
-        <p:txBody>
-          <a:bodyPr/>
-          <a:lstStyle/>
-          <a:p>
-            <a:r>
-              <a:rPr lang="en-GB" dirty="0"/>
-              <a:t>Version Control System</a:t>
-            </a:r>
-          </a:p>
-        </p:txBody>
-      </p:sp>
-      <p:sp>
-        <p:nvSpPr>
-          <p:cNvPr id="3" name="Content Placeholder 2">
-            <a:extLst>
-              <a:ext uri="{FF2B5EF4-FFF2-40B4-BE49-F238E27FC236}">
-                <a16:creationId xmlns:a16="http://schemas.microsoft.com/office/drawing/2014/main" id="{0E7D01A9-B413-4413-81A5-ADE470F14259}"/>
-              </a:ext>
-            </a:extLst>
-          </p:cNvPr>
-          <p:cNvSpPr>
-            <a:spLocks noGrp="1"/>
-          </p:cNvSpPr>
-          <p:nvPr>
-            <p:ph idx="1"/>
-          </p:nvPr>
-        </p:nvSpPr>
-        <p:spPr/>
-        <p:txBody>
-          <a:bodyPr/>
-          <a:lstStyle/>
-          <a:p>
-            <a:r>
-              <a:rPr lang="en-GB" dirty="0"/>
-              <a:t>Throughout the whole project it was essential I had a repository that contained all of the necessary files relating to the project.</a:t>
-            </a:r>
-          </a:p>
-          <a:p>
-            <a:r>
-              <a:rPr lang="en-GB" dirty="0"/>
-              <a:t>The VCS that was decided upon is the commonly used </a:t>
-            </a:r>
-            <a:r>
-              <a:rPr lang="en-GB" b="1" dirty="0"/>
-              <a:t>Git</a:t>
-            </a:r>
-            <a:r>
-              <a:rPr lang="en-GB" dirty="0"/>
-              <a:t>. Git allows me not only to edit my local machine but to push all of my work with commits to a cloud system named </a:t>
-            </a:r>
-            <a:r>
-              <a:rPr lang="en-GB" b="1" dirty="0"/>
-              <a:t>GitHub</a:t>
-            </a:r>
-            <a:r>
-              <a:rPr lang="en-GB" dirty="0"/>
-              <a:t>. </a:t>
-            </a:r>
-          </a:p>
-          <a:p>
-            <a:r>
-              <a:rPr lang="en-GB" dirty="0"/>
-              <a:t>This was ultimately essential not only for ease of use to showcase the project or if I intended to work on the project from a different device but also for project integrity meaning if I was to mistakenly edit any aspect of the project or code in an unintended way, I can just pull a previous commit with the file progress I made up until then.</a:t>
+            <a:off x="7859485" y="634946"/>
+            <a:ext cx="3690257" cy="1450757"/>
+          </a:xfrm>
+        </p:spPr>
+        <p:txBody>
+          <a:bodyPr>
+            <a:normAutofit/>
+          </a:bodyPr>
+          <a:lstStyle/>
+          <a:p>
+            <a:r>
+              <a:rPr lang="en-GB"/>
+              <a:t>Database beginning</a:t>
             </a:r>
           </a:p>
         </p:txBody>
       </p:sp>
       <p:pic>
         <p:nvPicPr>
-          <p:cNvPr id="4" name="Picture 3">
-            <a:extLst>
-              <a:ext uri="{FF2B5EF4-FFF2-40B4-BE49-F238E27FC236}">
-                <a16:creationId xmlns:a16="http://schemas.microsoft.com/office/drawing/2014/main" id="{41E11378-3876-4DF4-8AE1-A2097CBD88DE}"/>
+          <p:cNvPr id="5" name="Picture 4" descr="A close up of a map&#10;&#10;Description automatically generated">
+            <a:extLst>
+              <a:ext uri="{FF2B5EF4-FFF2-40B4-BE49-F238E27FC236}">
+                <a16:creationId xmlns:a16="http://schemas.microsoft.com/office/drawing/2014/main" id="{3E489E06-1DE6-4D99-8CE8-639968D30F19}"/>
               </a:ext>
             </a:extLst>
           </p:cNvPr>
@@ -6648,26 +7389,181 @@
           </p:cNvPicPr>
           <p:nvPr/>
         </p:nvPicPr>
-        <p:blipFill>
-          <a:blip r:embed="rId2"/>
-          <a:stretch>
-            <a:fillRect/>
-          </a:stretch>
+        <p:blipFill rotWithShape="1">
+          <a:blip r:embed="rId2">
+            <a:extLst>
+              <a:ext uri="{28A0092B-C50C-407E-A947-70E740481C1C}">
+                <a14:useLocalDpi xmlns:a14="http://schemas.microsoft.com/office/drawing/2010/main" val="0"/>
+              </a:ext>
+            </a:extLst>
+          </a:blip>
+          <a:srcRect l="4110"/>
+          <a:stretch/>
         </p:blipFill>
         <p:spPr>
           <a:xfrm>
-            <a:off x="7449136" y="356235"/>
-            <a:ext cx="3314700" cy="1381125"/>
+            <a:off x="633999" y="640081"/>
+            <a:ext cx="6909801" cy="5314406"/>
           </a:xfrm>
           <a:prstGeom prst="rect">
             <a:avLst/>
           </a:prstGeom>
         </p:spPr>
       </p:pic>
+      <p:cxnSp>
+        <p:nvCxnSpPr>
+          <p:cNvPr id="33" name="Straight Connector 32">
+            <a:extLst>
+              <a:ext uri="{FF2B5EF4-FFF2-40B4-BE49-F238E27FC236}">
+                <a16:creationId xmlns:a16="http://schemas.microsoft.com/office/drawing/2014/main" id="{89EB8C68-FF1B-4849-867B-32D29B19F102}"/>
+              </a:ext>
+              <a:ext uri="{C183D7F6-B498-43B3-948B-1728B52AA6E4}">
+                <adec:decorative xmlns:adec="http://schemas.microsoft.com/office/drawing/2017/decorative" val="1"/>
+              </a:ext>
+            </a:extLst>
+          </p:cNvPr>
+          <p:cNvCxnSpPr>
+            <a:cxnSpLocks noGrp="1" noRot="1" noChangeAspect="1" noMove="1" noResize="1" noEditPoints="1" noAdjustHandles="1" noChangeArrowheads="1" noChangeShapeType="1"/>
+          </p:cNvCxnSpPr>
+          <p:nvPr>
+            <p:extLst>
+              <p:ext uri="{386F3935-93C4-4BCD-93E2-E3B085C9AB24}">
+                <p16:designElem xmlns:p16="http://schemas.microsoft.com/office/powerpoint/2015/main" val="1"/>
+              </p:ext>
+            </p:extLst>
+          </p:nvPr>
+        </p:nvCxnSpPr>
+        <p:spPr>
+          <a:xfrm>
+            <a:off x="7942633" y="2250460"/>
+            <a:ext cx="3474720" cy="0"/>
+          </a:xfrm>
+          <a:prstGeom prst="line">
+            <a:avLst/>
+          </a:prstGeom>
+          <a:ln w="12700">
+            <a:solidFill>
+              <a:schemeClr val="tx1">
+                <a:lumMod val="75000"/>
+                <a:lumOff val="25000"/>
+              </a:schemeClr>
+            </a:solidFill>
+          </a:ln>
+        </p:spPr>
+        <p:style>
+          <a:lnRef idx="1">
+            <a:schemeClr val="accent1"/>
+          </a:lnRef>
+          <a:fillRef idx="0">
+            <a:schemeClr val="accent1"/>
+          </a:fillRef>
+          <a:effectRef idx="0">
+            <a:schemeClr val="accent1"/>
+          </a:effectRef>
+          <a:fontRef idx="minor">
+            <a:schemeClr val="tx1"/>
+          </a:fontRef>
+        </p:style>
+      </p:cxnSp>
+      <p:sp>
+        <p:nvSpPr>
+          <p:cNvPr id="3" name="Content Placeholder 2">
+            <a:extLst>
+              <a:ext uri="{FF2B5EF4-FFF2-40B4-BE49-F238E27FC236}">
+                <a16:creationId xmlns:a16="http://schemas.microsoft.com/office/drawing/2014/main" id="{486E80D6-371F-4EB2-80BD-C4E5799131E4}"/>
+              </a:ext>
+            </a:extLst>
+          </p:cNvPr>
+          <p:cNvSpPr>
+            <a:spLocks noGrp="1"/>
+          </p:cNvSpPr>
+          <p:nvPr>
+            <p:ph idx="1"/>
+          </p:nvPr>
+        </p:nvSpPr>
+        <p:spPr>
+          <a:xfrm>
+            <a:off x="7859485" y="2407436"/>
+            <a:ext cx="3690257" cy="3461658"/>
+          </a:xfrm>
+        </p:spPr>
+        <p:txBody>
+          <a:bodyPr>
+            <a:normAutofit/>
+          </a:bodyPr>
+          <a:lstStyle/>
+          <a:p>
+            <a:pPr>
+              <a:lnSpc>
+                <a:spcPct val="110000"/>
+              </a:lnSpc>
+            </a:pPr>
+            <a:r>
+              <a:rPr lang="en-GB"/>
+              <a:t>Once I had Jira completed I began the tasks required. This began with the development of necessary tables I will be using throughout the project. After the tables and columns were decided upon, I created an ERD for the tables. The ERD essentially shows the relationships between the tables in the database.</a:t>
+            </a:r>
+          </a:p>
+        </p:txBody>
+      </p:sp>
+      <p:sp>
+        <p:nvSpPr>
+          <p:cNvPr id="35" name="Rectangle 34">
+            <a:extLst>
+              <a:ext uri="{FF2B5EF4-FFF2-40B4-BE49-F238E27FC236}">
+                <a16:creationId xmlns:a16="http://schemas.microsoft.com/office/drawing/2014/main" id="{8B53612E-ADB2-4457-9688-89506397AF28}"/>
+              </a:ext>
+              <a:ext uri="{C183D7F6-B498-43B3-948B-1728B52AA6E4}">
+                <adec:decorative xmlns:adec="http://schemas.microsoft.com/office/drawing/2017/decorative" val="1"/>
+              </a:ext>
+            </a:extLst>
+          </p:cNvPr>
+          <p:cNvSpPr>
+            <a:spLocks noGrp="1" noRot="1" noChangeAspect="1" noMove="1" noResize="1" noEditPoints="1" noAdjustHandles="1" noChangeArrowheads="1" noChangeShapeType="1" noTextEdit="1"/>
+          </p:cNvSpPr>
+          <p:nvPr>
+            <p:extLst>
+              <p:ext uri="{386F3935-93C4-4BCD-93E2-E3B085C9AB24}">
+                <p16:designElem xmlns:p16="http://schemas.microsoft.com/office/powerpoint/2015/main" val="1"/>
+              </p:ext>
+            </p:extLst>
+          </p:nvPr>
+        </p:nvSpPr>
+        <p:spPr>
+          <a:xfrm>
+            <a:off x="1" y="6400800"/>
+            <a:ext cx="12192000" cy="457200"/>
+          </a:xfrm>
+          <a:prstGeom prst="rect">
+            <a:avLst/>
+          </a:prstGeom>
+          <a:solidFill>
+            <a:srgbClr val="262626"/>
+          </a:solidFill>
+          <a:ln>
+            <a:noFill/>
+          </a:ln>
+        </p:spPr>
+        <p:style>
+          <a:lnRef idx="2">
+            <a:schemeClr val="accent1">
+              <a:shade val="50000"/>
+            </a:schemeClr>
+          </a:lnRef>
+          <a:fillRef idx="1">
+            <a:schemeClr val="accent1"/>
+          </a:fillRef>
+          <a:effectRef idx="0">
+            <a:schemeClr val="accent1"/>
+          </a:effectRef>
+          <a:fontRef idx="minor">
+            <a:schemeClr val="lt1"/>
+          </a:fontRef>
+        </p:style>
+      </p:sp>
     </p:spTree>
     <p:extLst>
       <p:ext uri="{BB962C8B-B14F-4D97-AF65-F5344CB8AC3E}">
-        <p14:creationId xmlns:p14="http://schemas.microsoft.com/office/powerpoint/2010/main" val="881029316"/>
+        <p14:creationId xmlns:p14="http://schemas.microsoft.com/office/powerpoint/2010/main" val="1207738877"/>
       </p:ext>
     </p:extLst>
   </p:cSld>

</xml_diff>